<commit_message>
Teil3 - Software Präsentation update
Git Hub Link hinzugefügt
</commit_message>
<xml_diff>
--- a/Praesentationen_Schulungen/Teil3/2010_IOT_Schulung_Teil3_Software_v1.pptx
+++ b/Praesentationen_Schulungen/Teil3/2010_IOT_Schulung_Teil3_Software_v1.pptx
@@ -187,7 +187,7 @@
   <pc:docChgLst>
     <pc:chgData name="Armin" userId="c67f3e5b-be9f-4b38-9198-5811d350eee0" providerId="ADAL" clId="{A809C916-A960-47DA-B21E-7545F12928B4}"/>
     <pc:docChg chg="undo redo custSel addSld delSld modSld sldOrd modSection">
-      <pc:chgData name="Armin" userId="c67f3e5b-be9f-4b38-9198-5811d350eee0" providerId="ADAL" clId="{A809C916-A960-47DA-B21E-7545F12928B4}" dt="2020-10-12T15:07:17.133" v="2987" actId="20577"/>
+      <pc:chgData name="Armin" userId="c67f3e5b-be9f-4b38-9198-5811d350eee0" providerId="ADAL" clId="{A809C916-A960-47DA-B21E-7545F12928B4}" dt="2020-10-13T07:14:14.511" v="3006" actId="1076"/>
       <pc:docMkLst>
         <pc:docMk/>
       </pc:docMkLst>
@@ -207,7 +207,7 @@
         </pc:spChg>
       </pc:sldChg>
       <pc:sldChg chg="addSp delSp modSp mod">
-        <pc:chgData name="Armin" userId="c67f3e5b-be9f-4b38-9198-5811d350eee0" providerId="ADAL" clId="{A809C916-A960-47DA-B21E-7545F12928B4}" dt="2020-10-05T14:06:04.509" v="591" actId="1076"/>
+        <pc:chgData name="Armin" userId="c67f3e5b-be9f-4b38-9198-5811d350eee0" providerId="ADAL" clId="{A809C916-A960-47DA-B21E-7545F12928B4}" dt="2020-10-13T07:14:14.511" v="3006" actId="1076"/>
         <pc:sldMkLst>
           <pc:docMk/>
           <pc:sldMk cId="1233244460" sldId="257"/>
@@ -221,7 +221,7 @@
           </ac:spMkLst>
         </pc:spChg>
         <pc:spChg chg="mod">
-          <ac:chgData name="Armin" userId="c67f3e5b-be9f-4b38-9198-5811d350eee0" providerId="ADAL" clId="{A809C916-A960-47DA-B21E-7545F12928B4}" dt="2020-10-05T14:05:27.681" v="582" actId="20577"/>
+          <ac:chgData name="Armin" userId="c67f3e5b-be9f-4b38-9198-5811d350eee0" providerId="ADAL" clId="{A809C916-A960-47DA-B21E-7545F12928B4}" dt="2020-10-13T07:14:08.798" v="3005"/>
           <ac:spMkLst>
             <pc:docMk/>
             <pc:sldMk cId="1233244460" sldId="257"/>
@@ -237,7 +237,7 @@
           </ac:spMkLst>
         </pc:spChg>
         <pc:picChg chg="add del mod modCrop">
-          <ac:chgData name="Armin" userId="c67f3e5b-be9f-4b38-9198-5811d350eee0" providerId="ADAL" clId="{A809C916-A960-47DA-B21E-7545F12928B4}" dt="2020-10-05T14:06:04.509" v="591" actId="1076"/>
+          <ac:chgData name="Armin" userId="c67f3e5b-be9f-4b38-9198-5811d350eee0" providerId="ADAL" clId="{A809C916-A960-47DA-B21E-7545F12928B4}" dt="2020-10-13T07:14:14.511" v="3006" actId="1076"/>
           <ac:picMkLst>
             <pc:docMk/>
             <pc:sldMk cId="1233244460" sldId="257"/>
@@ -1481,7 +1481,7 @@
           <a:noFill/>
           <a:extLst>
             <a:ext uri="{909E8E84-426E-40dd-AFC4-6F175D3DCCD1}">
-              <a14:hiddenFill xmlns:a14="http://schemas.microsoft.com/office/drawing/2010/main" xmlns="">
+              <a14:hiddenFill xmlns="" xmlns:a14="http://schemas.microsoft.com/office/drawing/2010/main">
                 <a:solidFill>
                   <a:srgbClr val="FFFFFF"/>
                 </a:solidFill>
@@ -1541,7 +1541,7 @@
             </a:ln>
             <a:extLst>
               <a:ext uri="{91240B29-F687-4f45-9708-019B960494DF}">
-                <a14:hiddenLine xmlns:a14="http://schemas.microsoft.com/office/drawing/2010/main" xmlns="" w="9525">
+                <a14:hiddenLine xmlns="" xmlns:a14="http://schemas.microsoft.com/office/drawing/2010/main" w="9525">
                   <a:solidFill>
                     <a:srgbClr val="000000"/>
                   </a:solidFill>
@@ -1631,7 +1631,7 @@
             </a:ln>
             <a:extLst>
               <a:ext uri="{91240B29-F687-4f45-9708-019B960494DF}">
-                <a14:hiddenLine xmlns:a14="http://schemas.microsoft.com/office/drawing/2010/main" xmlns="" w="9525">
+                <a14:hiddenLine xmlns="" xmlns:a14="http://schemas.microsoft.com/office/drawing/2010/main" w="9525">
                   <a:solidFill>
                     <a:srgbClr val="000000"/>
                   </a:solidFill>
@@ -1721,7 +1721,7 @@
             </a:ln>
             <a:extLst>
               <a:ext uri="{91240B29-F687-4f45-9708-019B960494DF}">
-                <a14:hiddenLine xmlns:a14="http://schemas.microsoft.com/office/drawing/2010/main" xmlns="" w="9525">
+                <a14:hiddenLine xmlns="" xmlns:a14="http://schemas.microsoft.com/office/drawing/2010/main" w="9525">
                   <a:solidFill>
                     <a:srgbClr val="000000"/>
                   </a:solidFill>
@@ -1755,7 +1755,7 @@
             </a:ln>
             <a:extLst>
               <a:ext uri="{91240B29-F687-4f45-9708-019B960494DF}">
-                <a14:hiddenLine xmlns:a14="http://schemas.microsoft.com/office/drawing/2010/main" xmlns="" w="9525">
+                <a14:hiddenLine xmlns="" xmlns:a14="http://schemas.microsoft.com/office/drawing/2010/main" w="9525">
                   <a:solidFill>
                     <a:srgbClr val="000000"/>
                   </a:solidFill>
@@ -1845,7 +1845,7 @@
             </a:ln>
             <a:extLst>
               <a:ext uri="{91240B29-F687-4f45-9708-019B960494DF}">
-                <a14:hiddenLine xmlns:a14="http://schemas.microsoft.com/office/drawing/2010/main" xmlns="" w="9525">
+                <a14:hiddenLine xmlns="" xmlns:a14="http://schemas.microsoft.com/office/drawing/2010/main" w="9525">
                   <a:solidFill>
                     <a:srgbClr val="000000"/>
                   </a:solidFill>
@@ -1907,7 +1907,7 @@
             </a:ln>
             <a:extLst>
               <a:ext uri="{91240B29-F687-4f45-9708-019B960494DF}">
-                <a14:hiddenLine xmlns:a14="http://schemas.microsoft.com/office/drawing/2010/main" xmlns="" w="9525">
+                <a14:hiddenLine xmlns="" xmlns:a14="http://schemas.microsoft.com/office/drawing/2010/main" w="9525">
                   <a:solidFill>
                     <a:srgbClr val="000000"/>
                   </a:solidFill>
@@ -1969,7 +1969,7 @@
             </a:ln>
             <a:extLst>
               <a:ext uri="{91240B29-F687-4f45-9708-019B960494DF}">
-                <a14:hiddenLine xmlns:a14="http://schemas.microsoft.com/office/drawing/2010/main" xmlns="" w="9525">
+                <a14:hiddenLine xmlns="" xmlns:a14="http://schemas.microsoft.com/office/drawing/2010/main" w="9525">
                   <a:solidFill>
                     <a:srgbClr val="000000"/>
                   </a:solidFill>
@@ -2059,7 +2059,7 @@
             </a:ln>
             <a:extLst>
               <a:ext uri="{91240B29-F687-4f45-9708-019B960494DF}">
-                <a14:hiddenLine xmlns:a14="http://schemas.microsoft.com/office/drawing/2010/main" xmlns="" w="9525">
+                <a14:hiddenLine xmlns="" xmlns:a14="http://schemas.microsoft.com/office/drawing/2010/main" w="9525">
                   <a:solidFill>
                     <a:srgbClr val="000000"/>
                   </a:solidFill>
@@ -2121,7 +2121,7 @@
             </a:ln>
             <a:extLst>
               <a:ext uri="{91240B29-F687-4f45-9708-019B960494DF}">
-                <a14:hiddenLine xmlns:a14="http://schemas.microsoft.com/office/drawing/2010/main" xmlns="" w="9525">
+                <a14:hiddenLine xmlns="" xmlns:a14="http://schemas.microsoft.com/office/drawing/2010/main" w="9525">
                   <a:solidFill>
                     <a:srgbClr val="000000"/>
                   </a:solidFill>
@@ -2183,7 +2183,7 @@
             </a:ln>
             <a:extLst>
               <a:ext uri="{91240B29-F687-4f45-9708-019B960494DF}">
-                <a14:hiddenLine xmlns:a14="http://schemas.microsoft.com/office/drawing/2010/main" xmlns="" w="9525">
+                <a14:hiddenLine xmlns="" xmlns:a14="http://schemas.microsoft.com/office/drawing/2010/main" w="9525">
                   <a:solidFill>
                     <a:srgbClr val="000000"/>
                   </a:solidFill>
@@ -2273,7 +2273,7 @@
             </a:ln>
             <a:extLst>
               <a:ext uri="{91240B29-F687-4f45-9708-019B960494DF}">
-                <a14:hiddenLine xmlns:a14="http://schemas.microsoft.com/office/drawing/2010/main" xmlns="" w="9525">
+                <a14:hiddenLine xmlns="" xmlns:a14="http://schemas.microsoft.com/office/drawing/2010/main" w="9525">
                   <a:solidFill>
                     <a:srgbClr val="000000"/>
                   </a:solidFill>
@@ -2363,7 +2363,7 @@
             </a:ln>
             <a:extLst>
               <a:ext uri="{91240B29-F687-4f45-9708-019B960494DF}">
-                <a14:hiddenLine xmlns:a14="http://schemas.microsoft.com/office/drawing/2010/main" xmlns="" w="9525">
+                <a14:hiddenLine xmlns="" xmlns:a14="http://schemas.microsoft.com/office/drawing/2010/main" w="9525">
                   <a:solidFill>
                     <a:srgbClr val="000000"/>
                   </a:solidFill>
@@ -2425,7 +2425,7 @@
             </a:ln>
             <a:extLst>
               <a:ext uri="{91240B29-F687-4f45-9708-019B960494DF}">
-                <a14:hiddenLine xmlns:a14="http://schemas.microsoft.com/office/drawing/2010/main" xmlns="" w="9525">
+                <a14:hiddenLine xmlns="" xmlns:a14="http://schemas.microsoft.com/office/drawing/2010/main" w="9525">
                   <a:solidFill>
                     <a:srgbClr val="000000"/>
                   </a:solidFill>
@@ -2535,7 +2535,7 @@
             </a:ln>
             <a:extLst>
               <a:ext uri="{91240B29-F687-4f45-9708-019B960494DF}">
-                <a14:hiddenLine xmlns:a14="http://schemas.microsoft.com/office/drawing/2010/main" xmlns="" w="9525">
+                <a14:hiddenLine xmlns="" xmlns:a14="http://schemas.microsoft.com/office/drawing/2010/main" w="9525">
                   <a:solidFill>
                     <a:srgbClr val="000000"/>
                   </a:solidFill>
@@ -2597,7 +2597,7 @@
             </a:ln>
             <a:extLst>
               <a:ext uri="{91240B29-F687-4f45-9708-019B960494DF}">
-                <a14:hiddenLine xmlns:a14="http://schemas.microsoft.com/office/drawing/2010/main" xmlns="" w="9525">
+                <a14:hiddenLine xmlns="" xmlns:a14="http://schemas.microsoft.com/office/drawing/2010/main" w="9525">
                   <a:solidFill>
                     <a:srgbClr val="000000"/>
                   </a:solidFill>
@@ -2687,7 +2687,7 @@
             </a:ln>
             <a:extLst>
               <a:ext uri="{91240B29-F687-4f45-9708-019B960494DF}">
-                <a14:hiddenLine xmlns:a14="http://schemas.microsoft.com/office/drawing/2010/main" xmlns="" w="9525">
+                <a14:hiddenLine xmlns="" xmlns:a14="http://schemas.microsoft.com/office/drawing/2010/main" w="9525">
                   <a:solidFill>
                     <a:srgbClr val="000000"/>
                   </a:solidFill>
@@ -2777,7 +2777,7 @@
             </a:ln>
             <a:extLst>
               <a:ext uri="{91240B29-F687-4f45-9708-019B960494DF}">
-                <a14:hiddenLine xmlns:a14="http://schemas.microsoft.com/office/drawing/2010/main" xmlns="" w="9525">
+                <a14:hiddenLine xmlns="" xmlns:a14="http://schemas.microsoft.com/office/drawing/2010/main" w="9525">
                   <a:solidFill>
                     <a:srgbClr val="000000"/>
                   </a:solidFill>
@@ -2839,7 +2839,7 @@
             </a:ln>
             <a:extLst>
               <a:ext uri="{91240B29-F687-4f45-9708-019B960494DF}">
-                <a14:hiddenLine xmlns:a14="http://schemas.microsoft.com/office/drawing/2010/main" xmlns="" w="9525">
+                <a14:hiddenLine xmlns="" xmlns:a14="http://schemas.microsoft.com/office/drawing/2010/main" w="9525">
                   <a:solidFill>
                     <a:srgbClr val="000000"/>
                   </a:solidFill>
@@ -2929,7 +2929,7 @@
             </a:ln>
             <a:extLst>
               <a:ext uri="{91240B29-F687-4f45-9708-019B960494DF}">
-                <a14:hiddenLine xmlns:a14="http://schemas.microsoft.com/office/drawing/2010/main" xmlns="" w="9525">
+                <a14:hiddenLine xmlns="" xmlns:a14="http://schemas.microsoft.com/office/drawing/2010/main" w="9525">
                   <a:solidFill>
                     <a:srgbClr val="000000"/>
                   </a:solidFill>
@@ -3019,7 +3019,7 @@
             </a:ln>
             <a:extLst>
               <a:ext uri="{91240B29-F687-4f45-9708-019B960494DF}">
-                <a14:hiddenLine xmlns:a14="http://schemas.microsoft.com/office/drawing/2010/main" xmlns="" w="9525">
+                <a14:hiddenLine xmlns="" xmlns:a14="http://schemas.microsoft.com/office/drawing/2010/main" w="9525">
                   <a:solidFill>
                     <a:srgbClr val="000000"/>
                   </a:solidFill>
@@ -3075,7 +3075,7 @@
             </a:ln>
             <a:extLst>
               <a:ext uri="{91240B29-F687-4f45-9708-019B960494DF}">
-                <a14:hiddenLine xmlns:a14="http://schemas.microsoft.com/office/drawing/2010/main" xmlns="" w="9525">
+                <a14:hiddenLine xmlns="" xmlns:a14="http://schemas.microsoft.com/office/drawing/2010/main" w="9525">
                   <a:solidFill>
                     <a:srgbClr val="000000"/>
                   </a:solidFill>
@@ -3165,7 +3165,7 @@
             </a:ln>
             <a:extLst>
               <a:ext uri="{91240B29-F687-4f45-9708-019B960494DF}">
-                <a14:hiddenLine xmlns:a14="http://schemas.microsoft.com/office/drawing/2010/main" xmlns="" w="9525">
+                <a14:hiddenLine xmlns="" xmlns:a14="http://schemas.microsoft.com/office/drawing/2010/main" w="9525">
                   <a:solidFill>
                     <a:srgbClr val="000000"/>
                   </a:solidFill>
@@ -3221,7 +3221,7 @@
             </a:ln>
             <a:extLst>
               <a:ext uri="{91240B29-F687-4f45-9708-019B960494DF}">
-                <a14:hiddenLine xmlns:a14="http://schemas.microsoft.com/office/drawing/2010/main" xmlns="" w="9525">
+                <a14:hiddenLine xmlns="" xmlns:a14="http://schemas.microsoft.com/office/drawing/2010/main" w="9525">
                   <a:solidFill>
                     <a:srgbClr val="000000"/>
                   </a:solidFill>
@@ -3311,7 +3311,7 @@
             </a:ln>
             <a:extLst>
               <a:ext uri="{91240B29-F687-4f45-9708-019B960494DF}">
-                <a14:hiddenLine xmlns:a14="http://schemas.microsoft.com/office/drawing/2010/main" xmlns="" w="9525">
+                <a14:hiddenLine xmlns="" xmlns:a14="http://schemas.microsoft.com/office/drawing/2010/main" w="9525">
                   <a:solidFill>
                     <a:srgbClr val="000000"/>
                   </a:solidFill>
@@ -3379,7 +3379,7 @@
             </a:ln>
             <a:extLst>
               <a:ext uri="{91240B29-F687-4f45-9708-019B960494DF}">
-                <a14:hiddenLine xmlns:a14="http://schemas.microsoft.com/office/drawing/2010/main" xmlns="" w="9525">
+                <a14:hiddenLine xmlns="" xmlns:a14="http://schemas.microsoft.com/office/drawing/2010/main" w="9525">
                   <a:solidFill>
                     <a:srgbClr val="000000"/>
                   </a:solidFill>
@@ -3469,7 +3469,7 @@
             </a:ln>
             <a:extLst>
               <a:ext uri="{91240B29-F687-4f45-9708-019B960494DF}">
-                <a14:hiddenLine xmlns:a14="http://schemas.microsoft.com/office/drawing/2010/main" xmlns="" w="9525">
+                <a14:hiddenLine xmlns="" xmlns:a14="http://schemas.microsoft.com/office/drawing/2010/main" w="9525">
                   <a:solidFill>
                     <a:srgbClr val="000000"/>
                   </a:solidFill>
@@ -3537,7 +3537,7 @@
             </a:ln>
             <a:extLst>
               <a:ext uri="{91240B29-F687-4f45-9708-019B960494DF}">
-                <a14:hiddenLine xmlns:a14="http://schemas.microsoft.com/office/drawing/2010/main" xmlns="" w="9525">
+                <a14:hiddenLine xmlns="" xmlns:a14="http://schemas.microsoft.com/office/drawing/2010/main" w="9525">
                   <a:solidFill>
                     <a:srgbClr val="000000"/>
                   </a:solidFill>
@@ -3627,7 +3627,7 @@
             </a:ln>
             <a:extLst>
               <a:ext uri="{91240B29-F687-4f45-9708-019B960494DF}">
-                <a14:hiddenLine xmlns:a14="http://schemas.microsoft.com/office/drawing/2010/main" xmlns="" w="9525">
+                <a14:hiddenLine xmlns="" xmlns:a14="http://schemas.microsoft.com/office/drawing/2010/main" w="9525">
                   <a:solidFill>
                     <a:srgbClr val="000000"/>
                   </a:solidFill>
@@ -3661,7 +3661,7 @@
             </a:ln>
             <a:extLst>
               <a:ext uri="{91240B29-F687-4f45-9708-019B960494DF}">
-                <a14:hiddenLine xmlns:a14="http://schemas.microsoft.com/office/drawing/2010/main" xmlns="" w="9525">
+                <a14:hiddenLine xmlns="" xmlns:a14="http://schemas.microsoft.com/office/drawing/2010/main" w="9525">
                   <a:solidFill>
                     <a:srgbClr val="000000"/>
                   </a:solidFill>
@@ -3751,7 +3751,7 @@
             </a:ln>
             <a:extLst>
               <a:ext uri="{91240B29-F687-4f45-9708-019B960494DF}">
-                <a14:hiddenLine xmlns:a14="http://schemas.microsoft.com/office/drawing/2010/main" xmlns="" w="9525">
+                <a14:hiddenLine xmlns="" xmlns:a14="http://schemas.microsoft.com/office/drawing/2010/main" w="9525">
                   <a:solidFill>
                     <a:srgbClr val="000000"/>
                   </a:solidFill>
@@ -3813,7 +3813,7 @@
             </a:ln>
             <a:extLst>
               <a:ext uri="{91240B29-F687-4f45-9708-019B960494DF}">
-                <a14:hiddenLine xmlns:a14="http://schemas.microsoft.com/office/drawing/2010/main" xmlns="" w="9525">
+                <a14:hiddenLine xmlns="" xmlns:a14="http://schemas.microsoft.com/office/drawing/2010/main" w="9525">
                   <a:solidFill>
                     <a:srgbClr val="000000"/>
                   </a:solidFill>
@@ -3875,7 +3875,7 @@
             </a:ln>
             <a:extLst>
               <a:ext uri="{91240B29-F687-4f45-9708-019B960494DF}">
-                <a14:hiddenLine xmlns:a14="http://schemas.microsoft.com/office/drawing/2010/main" xmlns="" w="9525">
+                <a14:hiddenLine xmlns="" xmlns:a14="http://schemas.microsoft.com/office/drawing/2010/main" w="9525">
                   <a:solidFill>
                     <a:srgbClr val="000000"/>
                   </a:solidFill>
@@ -3965,7 +3965,7 @@
             </a:ln>
             <a:extLst>
               <a:ext uri="{91240B29-F687-4f45-9708-019B960494DF}">
-                <a14:hiddenLine xmlns:a14="http://schemas.microsoft.com/office/drawing/2010/main" xmlns="" w="9525">
+                <a14:hiddenLine xmlns="" xmlns:a14="http://schemas.microsoft.com/office/drawing/2010/main" w="9525">
                   <a:solidFill>
                     <a:srgbClr val="000000"/>
                   </a:solidFill>
@@ -4033,7 +4033,7 @@
             </a:ln>
             <a:extLst>
               <a:ext uri="{91240B29-F687-4f45-9708-019B960494DF}">
-                <a14:hiddenLine xmlns:a14="http://schemas.microsoft.com/office/drawing/2010/main" xmlns="" w="9525">
+                <a14:hiddenLine xmlns="" xmlns:a14="http://schemas.microsoft.com/office/drawing/2010/main" w="9525">
                   <a:solidFill>
                     <a:srgbClr val="000000"/>
                   </a:solidFill>
@@ -4095,7 +4095,7 @@
             </a:ln>
             <a:extLst>
               <a:ext uri="{91240B29-F687-4f45-9708-019B960494DF}">
-                <a14:hiddenLine xmlns:a14="http://schemas.microsoft.com/office/drawing/2010/main" xmlns="" w="9525">
+                <a14:hiddenLine xmlns="" xmlns:a14="http://schemas.microsoft.com/office/drawing/2010/main" w="9525">
                   <a:solidFill>
                     <a:srgbClr val="000000"/>
                   </a:solidFill>
@@ -4185,7 +4185,7 @@
             </a:ln>
             <a:extLst>
               <a:ext uri="{91240B29-F687-4f45-9708-019B960494DF}">
-                <a14:hiddenLine xmlns:a14="http://schemas.microsoft.com/office/drawing/2010/main" xmlns="" w="9525">
+                <a14:hiddenLine xmlns="" xmlns:a14="http://schemas.microsoft.com/office/drawing/2010/main" w="9525">
                   <a:solidFill>
                     <a:srgbClr val="000000"/>
                   </a:solidFill>
@@ -4247,7 +4247,7 @@
             </a:ln>
             <a:extLst>
               <a:ext uri="{91240B29-F687-4f45-9708-019B960494DF}">
-                <a14:hiddenLine xmlns:a14="http://schemas.microsoft.com/office/drawing/2010/main" xmlns="" w="9525">
+                <a14:hiddenLine xmlns="" xmlns:a14="http://schemas.microsoft.com/office/drawing/2010/main" w="9525">
                   <a:solidFill>
                     <a:srgbClr val="000000"/>
                   </a:solidFill>
@@ -4337,7 +4337,7 @@
             </a:ln>
             <a:extLst>
               <a:ext uri="{91240B29-F687-4f45-9708-019B960494DF}">
-                <a14:hiddenLine xmlns:a14="http://schemas.microsoft.com/office/drawing/2010/main" xmlns="" w="9525">
+                <a14:hiddenLine xmlns="" xmlns:a14="http://schemas.microsoft.com/office/drawing/2010/main" w="9525">
                   <a:solidFill>
                     <a:srgbClr val="000000"/>
                   </a:solidFill>
@@ -4399,7 +4399,7 @@
             </a:ln>
             <a:extLst>
               <a:ext uri="{91240B29-F687-4f45-9708-019B960494DF}">
-                <a14:hiddenLine xmlns:a14="http://schemas.microsoft.com/office/drawing/2010/main" xmlns="" w="9525">
+                <a14:hiddenLine xmlns="" xmlns:a14="http://schemas.microsoft.com/office/drawing/2010/main" w="9525">
                   <a:solidFill>
                     <a:srgbClr val="000000"/>
                   </a:solidFill>
@@ -4489,7 +4489,7 @@
             </a:ln>
             <a:extLst>
               <a:ext uri="{91240B29-F687-4f45-9708-019B960494DF}">
-                <a14:hiddenLine xmlns:a14="http://schemas.microsoft.com/office/drawing/2010/main" xmlns="" w="9525">
+                <a14:hiddenLine xmlns="" xmlns:a14="http://schemas.microsoft.com/office/drawing/2010/main" w="9525">
                   <a:solidFill>
                     <a:srgbClr val="000000"/>
                   </a:solidFill>
@@ -4523,7 +4523,7 @@
             </a:ln>
             <a:extLst>
               <a:ext uri="{91240B29-F687-4f45-9708-019B960494DF}">
-                <a14:hiddenLine xmlns:a14="http://schemas.microsoft.com/office/drawing/2010/main" xmlns="" w="9525">
+                <a14:hiddenLine xmlns="" xmlns:a14="http://schemas.microsoft.com/office/drawing/2010/main" w="9525">
                   <a:solidFill>
                     <a:srgbClr val="000000"/>
                   </a:solidFill>
@@ -4588,7 +4588,7 @@
             </a:ln>
             <a:extLst>
               <a:ext uri="{91240B29-F687-4f45-9708-019B960494DF}">
-                <a14:hiddenLine xmlns:a14="http://schemas.microsoft.com/office/drawing/2010/main" xmlns="" w="9525">
+                <a14:hiddenLine xmlns="" xmlns:a14="http://schemas.microsoft.com/office/drawing/2010/main" w="9525">
                   <a:solidFill>
                     <a:srgbClr val="000000"/>
                   </a:solidFill>
@@ -4678,7 +4678,7 @@
             </a:ln>
             <a:extLst>
               <a:ext uri="{91240B29-F687-4f45-9708-019B960494DF}">
-                <a14:hiddenLine xmlns:a14="http://schemas.microsoft.com/office/drawing/2010/main" xmlns="" w="9525">
+                <a14:hiddenLine xmlns="" xmlns:a14="http://schemas.microsoft.com/office/drawing/2010/main" w="9525">
                   <a:solidFill>
                     <a:srgbClr val="000000"/>
                   </a:solidFill>
@@ -4740,7 +4740,7 @@
             </a:ln>
             <a:extLst>
               <a:ext uri="{91240B29-F687-4f45-9708-019B960494DF}">
-                <a14:hiddenLine xmlns:a14="http://schemas.microsoft.com/office/drawing/2010/main" xmlns="" w="9525">
+                <a14:hiddenLine xmlns="" xmlns:a14="http://schemas.microsoft.com/office/drawing/2010/main" w="9525">
                   <a:solidFill>
                     <a:srgbClr val="000000"/>
                   </a:solidFill>
@@ -4830,7 +4830,7 @@
             </a:ln>
             <a:extLst>
               <a:ext uri="{91240B29-F687-4f45-9708-019B960494DF}">
-                <a14:hiddenLine xmlns:a14="http://schemas.microsoft.com/office/drawing/2010/main" xmlns="" w="9525">
+                <a14:hiddenLine xmlns="" xmlns:a14="http://schemas.microsoft.com/office/drawing/2010/main" w="9525">
                   <a:solidFill>
                     <a:srgbClr val="000000"/>
                   </a:solidFill>
@@ -4920,7 +4920,7 @@
             </a:ln>
             <a:extLst>
               <a:ext uri="{91240B29-F687-4f45-9708-019B960494DF}">
-                <a14:hiddenLine xmlns:a14="http://schemas.microsoft.com/office/drawing/2010/main" xmlns="" w="9525">
+                <a14:hiddenLine xmlns="" xmlns:a14="http://schemas.microsoft.com/office/drawing/2010/main" w="9525">
                   <a:solidFill>
                     <a:srgbClr val="000000"/>
                   </a:solidFill>
@@ -4985,7 +4985,7 @@
             </a:ln>
             <a:extLst>
               <a:ext uri="{91240B29-F687-4f45-9708-019B960494DF}">
-                <a14:hiddenLine xmlns:a14="http://schemas.microsoft.com/office/drawing/2010/main" xmlns="" w="9525">
+                <a14:hiddenLine xmlns="" xmlns:a14="http://schemas.microsoft.com/office/drawing/2010/main" w="9525">
                   <a:solidFill>
                     <a:srgbClr val="000000"/>
                   </a:solidFill>
@@ -5047,7 +5047,7 @@
             </a:ln>
             <a:extLst>
               <a:ext uri="{91240B29-F687-4f45-9708-019B960494DF}">
-                <a14:hiddenLine xmlns:a14="http://schemas.microsoft.com/office/drawing/2010/main" xmlns="" w="9525">
+                <a14:hiddenLine xmlns="" xmlns:a14="http://schemas.microsoft.com/office/drawing/2010/main" w="9525">
                   <a:solidFill>
                     <a:srgbClr val="000000"/>
                   </a:solidFill>
@@ -5137,7 +5137,7 @@
             </a:ln>
             <a:extLst>
               <a:ext uri="{91240B29-F687-4f45-9708-019B960494DF}">
-                <a14:hiddenLine xmlns:a14="http://schemas.microsoft.com/office/drawing/2010/main" xmlns="" w="9525">
+                <a14:hiddenLine xmlns="" xmlns:a14="http://schemas.microsoft.com/office/drawing/2010/main" w="9525">
                   <a:solidFill>
                     <a:srgbClr val="000000"/>
                   </a:solidFill>
@@ -5227,7 +5227,7 @@
             </a:ln>
             <a:extLst>
               <a:ext uri="{91240B29-F687-4f45-9708-019B960494DF}">
-                <a14:hiddenLine xmlns:a14="http://schemas.microsoft.com/office/drawing/2010/main" xmlns="" w="9525">
+                <a14:hiddenLine xmlns="" xmlns:a14="http://schemas.microsoft.com/office/drawing/2010/main" w="9525">
                   <a:solidFill>
                     <a:srgbClr val="000000"/>
                   </a:solidFill>
@@ -5289,7 +5289,7 @@
             </a:ln>
             <a:extLst>
               <a:ext uri="{91240B29-F687-4f45-9708-019B960494DF}">
-                <a14:hiddenLine xmlns:a14="http://schemas.microsoft.com/office/drawing/2010/main" xmlns="" w="9525">
+                <a14:hiddenLine xmlns="" xmlns:a14="http://schemas.microsoft.com/office/drawing/2010/main" w="9525">
                   <a:solidFill>
                     <a:srgbClr val="000000"/>
                   </a:solidFill>
@@ -5409,7 +5409,7 @@
             </a:ln>
             <a:extLst>
               <a:ext uri="{91240B29-F687-4f45-9708-019B960494DF}">
-                <a14:hiddenLine xmlns:a14="http://schemas.microsoft.com/office/drawing/2010/main" xmlns="" w="9525">
+                <a14:hiddenLine xmlns="" xmlns:a14="http://schemas.microsoft.com/office/drawing/2010/main" w="9525">
                   <a:solidFill>
                     <a:srgbClr val="000000"/>
                   </a:solidFill>
@@ -5477,7 +5477,7 @@
             </a:ln>
             <a:extLst>
               <a:ext uri="{91240B29-F687-4f45-9708-019B960494DF}">
-                <a14:hiddenLine xmlns:a14="http://schemas.microsoft.com/office/drawing/2010/main" xmlns="" w="9525">
+                <a14:hiddenLine xmlns="" xmlns:a14="http://schemas.microsoft.com/office/drawing/2010/main" w="9525">
                   <a:solidFill>
                     <a:srgbClr val="000000"/>
                   </a:solidFill>
@@ -5567,7 +5567,7 @@
             </a:ln>
             <a:extLst>
               <a:ext uri="{91240B29-F687-4f45-9708-019B960494DF}">
-                <a14:hiddenLine xmlns:a14="http://schemas.microsoft.com/office/drawing/2010/main" xmlns="" w="9525">
+                <a14:hiddenLine xmlns="" xmlns:a14="http://schemas.microsoft.com/office/drawing/2010/main" w="9525">
                   <a:solidFill>
                     <a:srgbClr val="000000"/>
                   </a:solidFill>
@@ -5705,7 +5705,7 @@
           <a:p>
             <a:fld id="{48A87A34-81AB-432B-8DAE-1953F412C126}" type="datetimeFigureOut">
               <a:rPr lang="en-US" dirty="0"/>
-              <a:t>10/12/2020</a:t>
+              <a:t>10/13/2020</a:t>
             </a:fld>
             <a:endParaRPr lang="en-US"/>
           </a:p>
@@ -5980,7 +5980,7 @@
           <a:p>
             <a:fld id="{48A87A34-81AB-432B-8DAE-1953F412C126}" type="datetimeFigureOut">
               <a:rPr lang="en-US" dirty="0"/>
-              <a:t>10/12/2020</a:t>
+              <a:t>10/13/2020</a:t>
             </a:fld>
             <a:endParaRPr lang="en-US"/>
           </a:p>
@@ -6181,7 +6181,7 @@
           <a:p>
             <a:fld id="{48A87A34-81AB-432B-8DAE-1953F412C126}" type="datetimeFigureOut">
               <a:rPr lang="en-US" dirty="0"/>
-              <a:t>10/12/2020</a:t>
+              <a:t>10/13/2020</a:t>
             </a:fld>
             <a:endParaRPr lang="en-US"/>
           </a:p>
@@ -6449,7 +6449,7 @@
           <a:p>
             <a:fld id="{48A87A34-81AB-432B-8DAE-1953F412C126}" type="datetimeFigureOut">
               <a:rPr lang="en-US" dirty="0"/>
-              <a:t>10/12/2020</a:t>
+              <a:t>10/13/2020</a:t>
             </a:fld>
             <a:endParaRPr lang="en-US"/>
           </a:p>
@@ -6888,7 +6888,7 @@
           <a:p>
             <a:fld id="{48A87A34-81AB-432B-8DAE-1953F412C126}" type="datetimeFigureOut">
               <a:rPr lang="en-US" dirty="0"/>
-              <a:t>10/12/2020</a:t>
+              <a:t>10/13/2020</a:t>
             </a:fld>
             <a:endParaRPr lang="en-US"/>
           </a:p>
@@ -7439,7 +7439,7 @@
           <a:p>
             <a:fld id="{48A87A34-81AB-432B-8DAE-1953F412C126}" type="datetimeFigureOut">
               <a:rPr lang="en-US" dirty="0"/>
-              <a:t>10/12/2020</a:t>
+              <a:t>10/13/2020</a:t>
             </a:fld>
             <a:endParaRPr lang="en-US"/>
           </a:p>
@@ -8161,7 +8161,7 @@
           <a:p>
             <a:fld id="{48A87A34-81AB-432B-8DAE-1953F412C126}" type="datetimeFigureOut">
               <a:rPr lang="en-US" dirty="0"/>
-              <a:t>10/12/2020</a:t>
+              <a:t>10/13/2020</a:t>
             </a:fld>
             <a:endParaRPr lang="en-US"/>
           </a:p>
@@ -8335,7 +8335,7 @@
           <a:p>
             <a:fld id="{48A87A34-81AB-432B-8DAE-1953F412C126}" type="datetimeFigureOut">
               <a:rPr lang="en-US" dirty="0"/>
-              <a:t>10/12/2020</a:t>
+              <a:t>10/13/2020</a:t>
             </a:fld>
             <a:endParaRPr lang="en-US"/>
           </a:p>
@@ -8519,7 +8519,7 @@
           <a:p>
             <a:fld id="{48A87A34-81AB-432B-8DAE-1953F412C126}" type="datetimeFigureOut">
               <a:rPr lang="en-US" dirty="0"/>
-              <a:t>10/12/2020</a:t>
+              <a:t>10/13/2020</a:t>
             </a:fld>
             <a:endParaRPr lang="en-US"/>
           </a:p>
@@ -8693,7 +8693,7 @@
           <a:p>
             <a:fld id="{48A87A34-81AB-432B-8DAE-1953F412C126}" type="datetimeFigureOut">
               <a:rPr lang="en-US" dirty="0"/>
-              <a:t>10/12/2020</a:t>
+              <a:t>10/13/2020</a:t>
             </a:fld>
             <a:endParaRPr lang="en-US"/>
           </a:p>
@@ -8948,7 +8948,7 @@
           <a:p>
             <a:fld id="{48A87A34-81AB-432B-8DAE-1953F412C126}" type="datetimeFigureOut">
               <a:rPr lang="en-US" dirty="0"/>
-              <a:t>10/12/2020</a:t>
+              <a:t>10/13/2020</a:t>
             </a:fld>
             <a:endParaRPr lang="en-US"/>
           </a:p>
@@ -9183,7 +9183,7 @@
           <a:p>
             <a:fld id="{48A87A34-81AB-432B-8DAE-1953F412C126}" type="datetimeFigureOut">
               <a:rPr lang="en-US" dirty="0"/>
-              <a:t>10/12/2020</a:t>
+              <a:t>10/13/2020</a:t>
             </a:fld>
             <a:endParaRPr lang="en-US"/>
           </a:p>
@@ -9567,7 +9567,7 @@
           <a:p>
             <a:fld id="{48A87A34-81AB-432B-8DAE-1953F412C126}" type="datetimeFigureOut">
               <a:rPr lang="en-US" dirty="0"/>
-              <a:t>10/12/2020</a:t>
+              <a:t>10/13/2020</a:t>
             </a:fld>
             <a:endParaRPr lang="en-US"/>
           </a:p>
@@ -9690,7 +9690,7 @@
           <a:p>
             <a:fld id="{48A87A34-81AB-432B-8DAE-1953F412C126}" type="datetimeFigureOut">
               <a:rPr lang="en-US" dirty="0"/>
-              <a:t>10/12/2020</a:t>
+              <a:t>10/13/2020</a:t>
             </a:fld>
             <a:endParaRPr lang="en-US"/>
           </a:p>
@@ -9791,7 +9791,7 @@
           <a:p>
             <a:fld id="{48A87A34-81AB-432B-8DAE-1953F412C126}" type="datetimeFigureOut">
               <a:rPr lang="en-US" dirty="0"/>
-              <a:t>10/12/2020</a:t>
+              <a:t>10/13/2020</a:t>
             </a:fld>
             <a:endParaRPr lang="en-US"/>
           </a:p>
@@ -10044,7 +10044,7 @@
           <a:p>
             <a:fld id="{48A87A34-81AB-432B-8DAE-1953F412C126}" type="datetimeFigureOut">
               <a:rPr lang="en-US" dirty="0"/>
-              <a:t>10/12/2020</a:t>
+              <a:t>10/13/2020</a:t>
             </a:fld>
             <a:endParaRPr lang="en-US"/>
           </a:p>
@@ -10328,7 +10328,7 @@
           <a:p>
             <a:fld id="{48A87A34-81AB-432B-8DAE-1953F412C126}" type="datetimeFigureOut">
               <a:rPr lang="en-US" dirty="0"/>
-              <a:t>10/12/2020</a:t>
+              <a:t>10/13/2020</a:t>
             </a:fld>
             <a:endParaRPr lang="en-US"/>
           </a:p>
@@ -10450,7 +10450,7 @@
           <a:noFill/>
           <a:extLst>
             <a:ext uri="{909E8E84-426E-40dd-AFC4-6F175D3DCCD1}">
-              <a14:hiddenFill xmlns:a14="http://schemas.microsoft.com/office/drawing/2010/main" xmlns="">
+              <a14:hiddenFill xmlns="" xmlns:a14="http://schemas.microsoft.com/office/drawing/2010/main">
                 <a:solidFill>
                   <a:srgbClr val="FFFFFF"/>
                 </a:solidFill>
@@ -10524,7 +10524,7 @@
               </a:ln>
               <a:extLst>
                 <a:ext uri="{91240B29-F687-4f45-9708-019B960494DF}">
-                  <a14:hiddenLine xmlns:a14="http://schemas.microsoft.com/office/drawing/2010/main" xmlns="" w="9525">
+                  <a14:hiddenLine xmlns="" xmlns:a14="http://schemas.microsoft.com/office/drawing/2010/main" w="9525">
                     <a:solidFill>
                       <a:srgbClr val="000000"/>
                     </a:solidFill>
@@ -10614,7 +10614,7 @@
               </a:ln>
               <a:extLst>
                 <a:ext uri="{91240B29-F687-4f45-9708-019B960494DF}">
-                  <a14:hiddenLine xmlns:a14="http://schemas.microsoft.com/office/drawing/2010/main" xmlns="" w="9525">
+                  <a14:hiddenLine xmlns="" xmlns:a14="http://schemas.microsoft.com/office/drawing/2010/main" w="9525">
                     <a:solidFill>
                       <a:srgbClr val="000000"/>
                     </a:solidFill>
@@ -10704,7 +10704,7 @@
               </a:ln>
               <a:extLst>
                 <a:ext uri="{91240B29-F687-4f45-9708-019B960494DF}">
-                  <a14:hiddenLine xmlns:a14="http://schemas.microsoft.com/office/drawing/2010/main" xmlns="" w="9525">
+                  <a14:hiddenLine xmlns="" xmlns:a14="http://schemas.microsoft.com/office/drawing/2010/main" w="9525">
                     <a:solidFill>
                       <a:srgbClr val="000000"/>
                     </a:solidFill>
@@ -10766,7 +10766,7 @@
               </a:ln>
               <a:extLst>
                 <a:ext uri="{91240B29-F687-4f45-9708-019B960494DF}">
-                  <a14:hiddenLine xmlns:a14="http://schemas.microsoft.com/office/drawing/2010/main" xmlns="" w="9525">
+                  <a14:hiddenLine xmlns="" xmlns:a14="http://schemas.microsoft.com/office/drawing/2010/main" w="9525">
                     <a:solidFill>
                       <a:srgbClr val="000000"/>
                     </a:solidFill>
@@ -10856,7 +10856,7 @@
               </a:ln>
               <a:extLst>
                 <a:ext uri="{91240B29-F687-4f45-9708-019B960494DF}">
-                  <a14:hiddenLine xmlns:a14="http://schemas.microsoft.com/office/drawing/2010/main" xmlns="" w="9525">
+                  <a14:hiddenLine xmlns="" xmlns:a14="http://schemas.microsoft.com/office/drawing/2010/main" w="9525">
                     <a:solidFill>
                       <a:srgbClr val="000000"/>
                     </a:solidFill>
@@ -10918,7 +10918,7 @@
               </a:ln>
               <a:extLst>
                 <a:ext uri="{91240B29-F687-4f45-9708-019B960494DF}">
-                  <a14:hiddenLine xmlns:a14="http://schemas.microsoft.com/office/drawing/2010/main" xmlns="" w="9525">
+                  <a14:hiddenLine xmlns="" xmlns:a14="http://schemas.microsoft.com/office/drawing/2010/main" w="9525">
                     <a:solidFill>
                       <a:srgbClr val="000000"/>
                     </a:solidFill>
@@ -10980,7 +10980,7 @@
               </a:ln>
               <a:extLst>
                 <a:ext uri="{91240B29-F687-4f45-9708-019B960494DF}">
-                  <a14:hiddenLine xmlns:a14="http://schemas.microsoft.com/office/drawing/2010/main" xmlns="" w="9525">
+                  <a14:hiddenLine xmlns="" xmlns:a14="http://schemas.microsoft.com/office/drawing/2010/main" w="9525">
                     <a:solidFill>
                       <a:srgbClr val="000000"/>
                     </a:solidFill>
@@ -11070,7 +11070,7 @@
               </a:ln>
               <a:extLst>
                 <a:ext uri="{91240B29-F687-4f45-9708-019B960494DF}">
-                  <a14:hiddenLine xmlns:a14="http://schemas.microsoft.com/office/drawing/2010/main" xmlns="" w="9525">
+                  <a14:hiddenLine xmlns="" xmlns:a14="http://schemas.microsoft.com/office/drawing/2010/main" w="9525">
                     <a:solidFill>
                       <a:srgbClr val="000000"/>
                     </a:solidFill>
@@ -11160,7 +11160,7 @@
               </a:ln>
               <a:extLst>
                 <a:ext uri="{91240B29-F687-4f45-9708-019B960494DF}">
-                  <a14:hiddenLine xmlns:a14="http://schemas.microsoft.com/office/drawing/2010/main" xmlns="" w="9525">
+                  <a14:hiddenLine xmlns="" xmlns:a14="http://schemas.microsoft.com/office/drawing/2010/main" w="9525">
                     <a:solidFill>
                       <a:srgbClr val="000000"/>
                     </a:solidFill>
@@ -11222,7 +11222,7 @@
               </a:ln>
               <a:extLst>
                 <a:ext uri="{91240B29-F687-4f45-9708-019B960494DF}">
-                  <a14:hiddenLine xmlns:a14="http://schemas.microsoft.com/office/drawing/2010/main" xmlns="" w="9525">
+                  <a14:hiddenLine xmlns="" xmlns:a14="http://schemas.microsoft.com/office/drawing/2010/main" w="9525">
                     <a:solidFill>
                       <a:srgbClr val="000000"/>
                     </a:solidFill>
@@ -11332,7 +11332,7 @@
               </a:ln>
               <a:extLst>
                 <a:ext uri="{91240B29-F687-4f45-9708-019B960494DF}">
-                  <a14:hiddenLine xmlns:a14="http://schemas.microsoft.com/office/drawing/2010/main" xmlns="" w="9525">
+                  <a14:hiddenLine xmlns="" xmlns:a14="http://schemas.microsoft.com/office/drawing/2010/main" w="9525">
                     <a:solidFill>
                       <a:srgbClr val="000000"/>
                     </a:solidFill>
@@ -11416,7 +11416,7 @@
               </a:ln>
               <a:extLst>
                 <a:ext uri="{91240B29-F687-4f45-9708-019B960494DF}">
-                  <a14:hiddenLine xmlns:a14="http://schemas.microsoft.com/office/drawing/2010/main" xmlns="" w="9525">
+                  <a14:hiddenLine xmlns="" xmlns:a14="http://schemas.microsoft.com/office/drawing/2010/main" w="9525">
                     <a:solidFill>
                       <a:srgbClr val="000000"/>
                     </a:solidFill>
@@ -11478,7 +11478,7 @@
               </a:ln>
               <a:extLst>
                 <a:ext uri="{91240B29-F687-4f45-9708-019B960494DF}">
-                  <a14:hiddenLine xmlns:a14="http://schemas.microsoft.com/office/drawing/2010/main" xmlns="" w="9525">
+                  <a14:hiddenLine xmlns="" xmlns:a14="http://schemas.microsoft.com/office/drawing/2010/main" w="9525">
                     <a:solidFill>
                       <a:srgbClr val="000000"/>
                     </a:solidFill>
@@ -11540,7 +11540,7 @@
               </a:ln>
               <a:extLst>
                 <a:ext uri="{91240B29-F687-4f45-9708-019B960494DF}">
-                  <a14:hiddenLine xmlns:a14="http://schemas.microsoft.com/office/drawing/2010/main" xmlns="" w="9525">
+                  <a14:hiddenLine xmlns="" xmlns:a14="http://schemas.microsoft.com/office/drawing/2010/main" w="9525">
                     <a:solidFill>
                       <a:srgbClr val="000000"/>
                     </a:solidFill>
@@ -11630,7 +11630,7 @@
               </a:ln>
               <a:extLst>
                 <a:ext uri="{91240B29-F687-4f45-9708-019B960494DF}">
-                  <a14:hiddenLine xmlns:a14="http://schemas.microsoft.com/office/drawing/2010/main" xmlns="" w="9525">
+                  <a14:hiddenLine xmlns="" xmlns:a14="http://schemas.microsoft.com/office/drawing/2010/main" w="9525">
                     <a:solidFill>
                       <a:srgbClr val="000000"/>
                     </a:solidFill>
@@ -11664,7 +11664,7 @@
               </a:ln>
               <a:extLst>
                 <a:ext uri="{91240B29-F687-4f45-9708-019B960494DF}">
-                  <a14:hiddenLine xmlns:a14="http://schemas.microsoft.com/office/drawing/2010/main" xmlns="" w="9525">
+                  <a14:hiddenLine xmlns="" xmlns:a14="http://schemas.microsoft.com/office/drawing/2010/main" w="9525">
                     <a:solidFill>
                       <a:srgbClr val="000000"/>
                     </a:solidFill>
@@ -11729,7 +11729,7 @@
               </a:ln>
               <a:extLst>
                 <a:ext uri="{91240B29-F687-4f45-9708-019B960494DF}">
-                  <a14:hiddenLine xmlns:a14="http://schemas.microsoft.com/office/drawing/2010/main" xmlns="" w="9525">
+                  <a14:hiddenLine xmlns="" xmlns:a14="http://schemas.microsoft.com/office/drawing/2010/main" w="9525">
                     <a:solidFill>
                       <a:srgbClr val="000000"/>
                     </a:solidFill>
@@ -11819,7 +11819,7 @@
               </a:ln>
               <a:extLst>
                 <a:ext uri="{91240B29-F687-4f45-9708-019B960494DF}">
-                  <a14:hiddenLine xmlns:a14="http://schemas.microsoft.com/office/drawing/2010/main" xmlns="" w="9525">
+                  <a14:hiddenLine xmlns="" xmlns:a14="http://schemas.microsoft.com/office/drawing/2010/main" w="9525">
                     <a:solidFill>
                       <a:srgbClr val="000000"/>
                     </a:solidFill>
@@ -11881,7 +11881,7 @@
               </a:ln>
               <a:extLst>
                 <a:ext uri="{91240B29-F687-4f45-9708-019B960494DF}">
-                  <a14:hiddenLine xmlns:a14="http://schemas.microsoft.com/office/drawing/2010/main" xmlns="" w="9525">
+                  <a14:hiddenLine xmlns="" xmlns:a14="http://schemas.microsoft.com/office/drawing/2010/main" w="9525">
                     <a:solidFill>
                       <a:srgbClr val="000000"/>
                     </a:solidFill>
@@ -11971,7 +11971,7 @@
               </a:ln>
               <a:extLst>
                 <a:ext uri="{91240B29-F687-4f45-9708-019B960494DF}">
-                  <a14:hiddenLine xmlns:a14="http://schemas.microsoft.com/office/drawing/2010/main" xmlns="" w="9525">
+                  <a14:hiddenLine xmlns="" xmlns:a14="http://schemas.microsoft.com/office/drawing/2010/main" w="9525">
                     <a:solidFill>
                       <a:srgbClr val="000000"/>
                     </a:solidFill>
@@ -12036,7 +12036,7 @@
               </a:ln>
               <a:extLst>
                 <a:ext uri="{91240B29-F687-4f45-9708-019B960494DF}">
-                  <a14:hiddenLine xmlns:a14="http://schemas.microsoft.com/office/drawing/2010/main" xmlns="" w="9525">
+                  <a14:hiddenLine xmlns="" xmlns:a14="http://schemas.microsoft.com/office/drawing/2010/main" w="9525">
                     <a:solidFill>
                       <a:srgbClr val="000000"/>
                     </a:solidFill>
@@ -12098,7 +12098,7 @@
               </a:ln>
               <a:extLst>
                 <a:ext uri="{91240B29-F687-4f45-9708-019B960494DF}">
-                  <a14:hiddenLine xmlns:a14="http://schemas.microsoft.com/office/drawing/2010/main" xmlns="" w="9525">
+                  <a14:hiddenLine xmlns="" xmlns:a14="http://schemas.microsoft.com/office/drawing/2010/main" w="9525">
                     <a:solidFill>
                       <a:srgbClr val="000000"/>
                     </a:solidFill>
@@ -12188,7 +12188,7 @@
               </a:ln>
               <a:extLst>
                 <a:ext uri="{91240B29-F687-4f45-9708-019B960494DF}">
-                  <a14:hiddenLine xmlns:a14="http://schemas.microsoft.com/office/drawing/2010/main" xmlns="" w="9525">
+                  <a14:hiddenLine xmlns="" xmlns:a14="http://schemas.microsoft.com/office/drawing/2010/main" w="9525">
                     <a:solidFill>
                       <a:srgbClr val="000000"/>
                     </a:solidFill>
@@ -12278,7 +12278,7 @@
               </a:ln>
               <a:extLst>
                 <a:ext uri="{91240B29-F687-4f45-9708-019B960494DF}">
-                  <a14:hiddenLine xmlns:a14="http://schemas.microsoft.com/office/drawing/2010/main" xmlns="" w="9525">
+                  <a14:hiddenLine xmlns="" xmlns:a14="http://schemas.microsoft.com/office/drawing/2010/main" w="9525">
                     <a:solidFill>
                       <a:srgbClr val="000000"/>
                     </a:solidFill>
@@ -12343,7 +12343,7 @@
               </a:ln>
               <a:extLst>
                 <a:ext uri="{91240B29-F687-4f45-9708-019B960494DF}">
-                  <a14:hiddenLine xmlns:a14="http://schemas.microsoft.com/office/drawing/2010/main" xmlns="" w="9525">
+                  <a14:hiddenLine xmlns="" xmlns:a14="http://schemas.microsoft.com/office/drawing/2010/main" w="9525">
                     <a:solidFill>
                       <a:srgbClr val="000000"/>
                     </a:solidFill>
@@ -12463,7 +12463,7 @@
               </a:ln>
               <a:extLst>
                 <a:ext uri="{91240B29-F687-4f45-9708-019B960494DF}">
-                  <a14:hiddenLine xmlns:a14="http://schemas.microsoft.com/office/drawing/2010/main" xmlns="" w="9525">
+                  <a14:hiddenLine xmlns="" xmlns:a14="http://schemas.microsoft.com/office/drawing/2010/main" w="9525">
                     <a:solidFill>
                       <a:srgbClr val="000000"/>
                     </a:solidFill>
@@ -12561,7 +12561,7 @@
               </a:ln>
               <a:extLst>
                 <a:ext uri="{91240B29-F687-4f45-9708-019B960494DF}">
-                  <a14:hiddenLine xmlns:a14="http://schemas.microsoft.com/office/drawing/2010/main" xmlns="" w="9525">
+                  <a14:hiddenLine xmlns="" xmlns:a14="http://schemas.microsoft.com/office/drawing/2010/main" w="9525">
                     <a:solidFill>
                       <a:srgbClr val="000000"/>
                     </a:solidFill>
@@ -12676,7 +12676,7 @@
               </a:ln>
               <a:extLst>
                 <a:ext uri="{91240B29-F687-4f45-9708-019B960494DF}">
-                  <a14:hiddenLine xmlns:a14="http://schemas.microsoft.com/office/drawing/2010/main" xmlns="" w="9525">
+                  <a14:hiddenLine xmlns="" xmlns:a14="http://schemas.microsoft.com/office/drawing/2010/main" w="9525">
                     <a:solidFill>
                       <a:srgbClr val="000000"/>
                     </a:solidFill>
@@ -12766,7 +12766,7 @@
               </a:ln>
               <a:extLst>
                 <a:ext uri="{91240B29-F687-4f45-9708-019B960494DF}">
-                  <a14:hiddenLine xmlns:a14="http://schemas.microsoft.com/office/drawing/2010/main" xmlns="" w="9525">
+                  <a14:hiddenLine xmlns="" xmlns:a14="http://schemas.microsoft.com/office/drawing/2010/main" w="9525">
                     <a:solidFill>
                       <a:srgbClr val="000000"/>
                     </a:solidFill>
@@ -12831,7 +12831,7 @@
               </a:ln>
               <a:extLst>
                 <a:ext uri="{91240B29-F687-4f45-9708-019B960494DF}">
-                  <a14:hiddenLine xmlns:a14="http://schemas.microsoft.com/office/drawing/2010/main" xmlns="" w="9525">
+                  <a14:hiddenLine xmlns="" xmlns:a14="http://schemas.microsoft.com/office/drawing/2010/main" w="9525">
                     <a:solidFill>
                       <a:srgbClr val="000000"/>
                     </a:solidFill>
@@ -12921,7 +12921,7 @@
               </a:ln>
               <a:extLst>
                 <a:ext uri="{91240B29-F687-4f45-9708-019B960494DF}">
-                  <a14:hiddenLine xmlns:a14="http://schemas.microsoft.com/office/drawing/2010/main" xmlns="" w="9525">
+                  <a14:hiddenLine xmlns="" xmlns:a14="http://schemas.microsoft.com/office/drawing/2010/main" w="9525">
                     <a:solidFill>
                       <a:srgbClr val="000000"/>
                     </a:solidFill>
@@ -12989,7 +12989,7 @@
               </a:ln>
               <a:extLst>
                 <a:ext uri="{91240B29-F687-4f45-9708-019B960494DF}">
-                  <a14:hiddenLine xmlns:a14="http://schemas.microsoft.com/office/drawing/2010/main" xmlns="" w="9525">
+                  <a14:hiddenLine xmlns="" xmlns:a14="http://schemas.microsoft.com/office/drawing/2010/main" w="9525">
                     <a:solidFill>
                       <a:srgbClr val="000000"/>
                     </a:solidFill>
@@ -13079,7 +13079,7 @@
               </a:ln>
               <a:extLst>
                 <a:ext uri="{91240B29-F687-4f45-9708-019B960494DF}">
-                  <a14:hiddenLine xmlns:a14="http://schemas.microsoft.com/office/drawing/2010/main" xmlns="" w="9525">
+                  <a14:hiddenLine xmlns="" xmlns:a14="http://schemas.microsoft.com/office/drawing/2010/main" w="9525">
                     <a:solidFill>
                       <a:srgbClr val="000000"/>
                     </a:solidFill>
@@ -13147,7 +13147,7 @@
               </a:ln>
               <a:extLst>
                 <a:ext uri="{91240B29-F687-4f45-9708-019B960494DF}">
-                  <a14:hiddenLine xmlns:a14="http://schemas.microsoft.com/office/drawing/2010/main" xmlns="" w="9525">
+                  <a14:hiddenLine xmlns="" xmlns:a14="http://schemas.microsoft.com/office/drawing/2010/main" w="9525">
                     <a:solidFill>
                       <a:srgbClr val="000000"/>
                     </a:solidFill>
@@ -13237,7 +13237,7 @@
               </a:ln>
               <a:extLst>
                 <a:ext uri="{91240B29-F687-4f45-9708-019B960494DF}">
-                  <a14:hiddenLine xmlns:a14="http://schemas.microsoft.com/office/drawing/2010/main" xmlns="" w="9525">
+                  <a14:hiddenLine xmlns="" xmlns:a14="http://schemas.microsoft.com/office/drawing/2010/main" w="9525">
                     <a:solidFill>
                       <a:srgbClr val="000000"/>
                     </a:solidFill>
@@ -13271,7 +13271,7 @@
               </a:ln>
               <a:extLst>
                 <a:ext uri="{91240B29-F687-4f45-9708-019B960494DF}">
-                  <a14:hiddenLine xmlns:a14="http://schemas.microsoft.com/office/drawing/2010/main" xmlns="" w="9525">
+                  <a14:hiddenLine xmlns="" xmlns:a14="http://schemas.microsoft.com/office/drawing/2010/main" w="9525">
                     <a:solidFill>
                       <a:srgbClr val="000000"/>
                     </a:solidFill>
@@ -18255,6 +18255,13 @@
           </a:p>
           <a:p>
             <a:pPr lvl="1"/>
+            <a:r>
+              <a:rPr lang="de-AT" dirty="0"/>
+              <a:t>GitHub Link: https://github.com/Snorp84/DigiPro_IOT_Arduino_Schulung</a:t>
+            </a:r>
+          </a:p>
+          <a:p>
+            <a:pPr lvl="1"/>
             <a:endParaRPr lang="de-DE" dirty="0"/>
           </a:p>
           <a:p>
@@ -18286,7 +18293,7 @@
         </p:blipFill>
         <p:spPr>
           <a:xfrm>
-            <a:off x="3738665" y="1910107"/>
+            <a:off x="3658766" y="2204423"/>
             <a:ext cx="4276926" cy="3586778"/>
           </a:xfrm>
           <a:prstGeom prst="rect">

</xml_diff>

<commit_message>
Update Software Präsentation Teil 3 - Echo und Einstellungsfenster
Genaue Beschreibung des Einstellungsfensters mit der seriellen Schnittstelle.
Erklärung der Echo Einstellung um die Eingabe in der seriellen Schnittstelle sehen zu können
</commit_message>
<xml_diff>
--- a/Praesentationen_Schulungen/Teil3/2010_IOT_Schulung_Teil3_Software_v1.pptx
+++ b/Praesentationen_Schulungen/Teil3/2010_IOT_Schulung_Teil3_Software_v1.pptx
@@ -23,14 +23,16 @@
     <p:sldId id="344" r:id="rId17"/>
     <p:sldId id="345" r:id="rId18"/>
     <p:sldId id="346" r:id="rId19"/>
-    <p:sldId id="348" r:id="rId20"/>
-    <p:sldId id="349" r:id="rId21"/>
-    <p:sldId id="347" r:id="rId22"/>
-    <p:sldId id="350" r:id="rId23"/>
-    <p:sldId id="352" r:id="rId24"/>
-    <p:sldId id="353" r:id="rId25"/>
-    <p:sldId id="354" r:id="rId26"/>
-    <p:sldId id="355" r:id="rId27"/>
+    <p:sldId id="356" r:id="rId20"/>
+    <p:sldId id="357" r:id="rId21"/>
+    <p:sldId id="348" r:id="rId22"/>
+    <p:sldId id="349" r:id="rId23"/>
+    <p:sldId id="347" r:id="rId24"/>
+    <p:sldId id="350" r:id="rId25"/>
+    <p:sldId id="352" r:id="rId26"/>
+    <p:sldId id="353" r:id="rId27"/>
+    <p:sldId id="354" r:id="rId28"/>
+    <p:sldId id="355" r:id="rId29"/>
   </p:sldIdLst>
   <p:sldSz cx="12192000" cy="6858000"/>
   <p:notesSz cx="6797675" cy="9926638"/>
@@ -152,6 +154,8 @@
             <p14:sldId id="344"/>
             <p14:sldId id="345"/>
             <p14:sldId id="346"/>
+            <p14:sldId id="356"/>
+            <p14:sldId id="357"/>
             <p14:sldId id="348"/>
             <p14:sldId id="349"/>
             <p14:sldId id="347"/>
@@ -177,7 +181,7 @@
 <file path=ppt/revisionInfo.xml><?xml version="1.0" encoding="utf-8"?>
 <p1510:revInfo xmlns:a="http://schemas.openxmlformats.org/drawingml/2006/main" xmlns:r="http://schemas.openxmlformats.org/officeDocument/2006/relationships" xmlns:p1510="http://schemas.microsoft.com/office/powerpoint/2015/10/main">
   <p1510:revLst>
-    <p1510:client id="{A809C916-A960-47DA-B21E-7545F12928B4}" v="84" dt="2020-10-12T15:03:17.245"/>
+    <p1510:client id="{A809C916-A960-47DA-B21E-7545F12928B4}" v="88" dt="2020-10-13T14:38:31.529"/>
   </p1510:revLst>
 </p1510:revInfo>
 </file>
@@ -187,7 +191,7 @@
   <pc:docChgLst>
     <pc:chgData name="Armin" userId="c67f3e5b-be9f-4b38-9198-5811d350eee0" providerId="ADAL" clId="{A809C916-A960-47DA-B21E-7545F12928B4}"/>
     <pc:docChg chg="undo redo custSel addSld delSld modSld sldOrd modSection">
-      <pc:chgData name="Armin" userId="c67f3e5b-be9f-4b38-9198-5811d350eee0" providerId="ADAL" clId="{A809C916-A960-47DA-B21E-7545F12928B4}" dt="2020-10-13T07:14:14.511" v="3006" actId="1076"/>
+      <pc:chgData name="Armin" userId="c67f3e5b-be9f-4b38-9198-5811d350eee0" providerId="ADAL" clId="{A809C916-A960-47DA-B21E-7545F12928B4}" dt="2020-10-13T14:47:07.630" v="3843" actId="20577"/>
       <pc:docMkLst>
         <pc:docMk/>
       </pc:docMkLst>
@@ -854,7 +858,7 @@
         </pc:cxnChg>
       </pc:sldChg>
       <pc:sldChg chg="addSp delSp modSp add mod">
-        <pc:chgData name="Armin" userId="c67f3e5b-be9f-4b38-9198-5811d350eee0" providerId="ADAL" clId="{A809C916-A960-47DA-B21E-7545F12928B4}" dt="2020-10-05T15:32:23.069" v="1817" actId="14100"/>
+        <pc:chgData name="Armin" userId="c67f3e5b-be9f-4b38-9198-5811d350eee0" providerId="ADAL" clId="{A809C916-A960-47DA-B21E-7545F12928B4}" dt="2020-10-13T14:37:48.086" v="3293" actId="478"/>
         <pc:sldMkLst>
           <pc:docMk/>
           <pc:sldMk cId="1263818746" sldId="346"/>
@@ -875,8 +879,8 @@
             <ac:spMk id="13" creationId="{7B3A3467-409A-4CA2-8002-B3483FEAB551}"/>
           </ac:spMkLst>
         </pc:spChg>
-        <pc:spChg chg="add mod">
-          <ac:chgData name="Armin" userId="c67f3e5b-be9f-4b38-9198-5811d350eee0" providerId="ADAL" clId="{A809C916-A960-47DA-B21E-7545F12928B4}" dt="2020-10-05T15:32:23.069" v="1817" actId="14100"/>
+        <pc:spChg chg="add del mod">
+          <ac:chgData name="Armin" userId="c67f3e5b-be9f-4b38-9198-5811d350eee0" providerId="ADAL" clId="{A809C916-A960-47DA-B21E-7545F12928B4}" dt="2020-10-13T14:37:44.324" v="3292" actId="478"/>
           <ac:spMkLst>
             <pc:docMk/>
             <pc:sldMk cId="1263818746" sldId="346"/>
@@ -889,6 +893,22 @@
             <pc:docMk/>
             <pc:sldMk cId="1263818746" sldId="346"/>
             <ac:picMk id="2" creationId="{FF054F5C-2575-462D-85EF-04612DB9A6C0}"/>
+          </ac:picMkLst>
+        </pc:picChg>
+        <pc:picChg chg="add del">
+          <ac:chgData name="Armin" userId="c67f3e5b-be9f-4b38-9198-5811d350eee0" providerId="ADAL" clId="{A809C916-A960-47DA-B21E-7545F12928B4}" dt="2020-10-13T14:33:54.683" v="3008" actId="22"/>
+          <ac:picMkLst>
+            <pc:docMk/>
+            <pc:sldMk cId="1263818746" sldId="346"/>
+            <ac:picMk id="4" creationId="{3D5A081A-BECB-45C4-A4B9-64B4F8F9BE30}"/>
+          </ac:picMkLst>
+        </pc:picChg>
+        <pc:picChg chg="add del">
+          <ac:chgData name="Armin" userId="c67f3e5b-be9f-4b38-9198-5811d350eee0" providerId="ADAL" clId="{A809C916-A960-47DA-B21E-7545F12928B4}" dt="2020-10-13T14:33:58.809" v="3010" actId="22"/>
+          <ac:picMkLst>
+            <pc:docMk/>
+            <pc:sldMk cId="1263818746" sldId="346"/>
+            <ac:picMk id="5" creationId="{326E546D-77AD-48D8-BE61-871E47EFC73F}"/>
           </ac:picMkLst>
         </pc:picChg>
         <pc:picChg chg="add mod modCrop">
@@ -923,8 +943,8 @@
             <ac:cxnSpMk id="8" creationId="{DFF5CC95-A6B2-491E-815C-90C77162D7E0}"/>
           </ac:cxnSpMkLst>
         </pc:cxnChg>
-        <pc:cxnChg chg="add mod">
-          <ac:chgData name="Armin" userId="c67f3e5b-be9f-4b38-9198-5811d350eee0" providerId="ADAL" clId="{A809C916-A960-47DA-B21E-7545F12928B4}" dt="2020-10-05T15:31:59.229" v="1812" actId="14100"/>
+        <pc:cxnChg chg="add del mod">
+          <ac:chgData name="Armin" userId="c67f3e5b-be9f-4b38-9198-5811d350eee0" providerId="ADAL" clId="{A809C916-A960-47DA-B21E-7545F12928B4}" dt="2020-10-13T14:37:48.086" v="3293" actId="478"/>
           <ac:cxnSpMkLst>
             <pc:docMk/>
             <pc:sldMk cId="1263818746" sldId="346"/>
@@ -1036,13 +1056,13 @@
         </pc:cxnChg>
       </pc:sldChg>
       <pc:sldChg chg="addSp delSp modSp add mod">
-        <pc:chgData name="Armin" userId="c67f3e5b-be9f-4b38-9198-5811d350eee0" providerId="ADAL" clId="{A809C916-A960-47DA-B21E-7545F12928B4}" dt="2020-10-05T15:53:16.389" v="2202" actId="20577"/>
+        <pc:chgData name="Armin" userId="c67f3e5b-be9f-4b38-9198-5811d350eee0" providerId="ADAL" clId="{A809C916-A960-47DA-B21E-7545F12928B4}" dt="2020-10-13T14:47:07.630" v="3843" actId="20577"/>
         <pc:sldMkLst>
           <pc:docMk/>
           <pc:sldMk cId="1824506345" sldId="348"/>
         </pc:sldMkLst>
         <pc:spChg chg="mod">
-          <ac:chgData name="Armin" userId="c67f3e5b-be9f-4b38-9198-5811d350eee0" providerId="ADAL" clId="{A809C916-A960-47DA-B21E-7545F12928B4}" dt="2020-10-05T15:53:16.389" v="2202" actId="20577"/>
+          <ac:chgData name="Armin" userId="c67f3e5b-be9f-4b38-9198-5811d350eee0" providerId="ADAL" clId="{A809C916-A960-47DA-B21E-7545F12928B4}" dt="2020-10-13T14:47:07.630" v="3843" actId="20577"/>
           <ac:spMkLst>
             <pc:docMk/>
             <pc:sldMk cId="1824506345" sldId="348"/>
@@ -1090,7 +1110,7 @@
           </ac:picMkLst>
         </pc:picChg>
         <pc:cxnChg chg="add mod">
-          <ac:chgData name="Armin" userId="c67f3e5b-be9f-4b38-9198-5811d350eee0" providerId="ADAL" clId="{A809C916-A960-47DA-B21E-7545F12928B4}" dt="2020-10-05T15:52:08.990" v="2066" actId="14100"/>
+          <ac:chgData name="Armin" userId="c67f3e5b-be9f-4b38-9198-5811d350eee0" providerId="ADAL" clId="{A809C916-A960-47DA-B21E-7545F12928B4}" dt="2020-10-13T14:45:59.655" v="3799" actId="14100"/>
           <ac:cxnSpMkLst>
             <pc:docMk/>
             <pc:sldMk cId="1824506345" sldId="348"/>
@@ -1426,6 +1446,108 @@
           <pc:sldMk cId="417278791" sldId="356"/>
         </pc:sldMkLst>
       </pc:sldChg>
+      <pc:sldChg chg="addSp delSp modSp add mod">
+        <pc:chgData name="Armin" userId="c67f3e5b-be9f-4b38-9198-5811d350eee0" providerId="ADAL" clId="{A809C916-A960-47DA-B21E-7545F12928B4}" dt="2020-10-13T14:38:39.924" v="3298" actId="1076"/>
+        <pc:sldMkLst>
+          <pc:docMk/>
+          <pc:sldMk cId="2634114682" sldId="356"/>
+        </pc:sldMkLst>
+        <pc:spChg chg="mod">
+          <ac:chgData name="Armin" userId="c67f3e5b-be9f-4b38-9198-5811d350eee0" providerId="ADAL" clId="{A809C916-A960-47DA-B21E-7545F12928B4}" dt="2020-10-13T14:36:12.173" v="3277" actId="20577"/>
+          <ac:spMkLst>
+            <pc:docMk/>
+            <pc:sldMk cId="2634114682" sldId="356"/>
+            <ac:spMk id="3" creationId="{1C8B7E14-C857-488D-BB1F-75146BAF3EB9}"/>
+          </ac:spMkLst>
+        </pc:spChg>
+        <pc:spChg chg="del">
+          <ac:chgData name="Armin" userId="c67f3e5b-be9f-4b38-9198-5811d350eee0" providerId="ADAL" clId="{A809C916-A960-47DA-B21E-7545F12928B4}" dt="2020-10-13T14:34:11.073" v="3016" actId="478"/>
+          <ac:spMkLst>
+            <pc:docMk/>
+            <pc:sldMk cId="2634114682" sldId="356"/>
+            <ac:spMk id="15" creationId="{95B5F7FB-50EF-463B-99B5-A28F40DC5D5B}"/>
+          </ac:spMkLst>
+        </pc:spChg>
+        <pc:picChg chg="del">
+          <ac:chgData name="Armin" userId="c67f3e5b-be9f-4b38-9198-5811d350eee0" providerId="ADAL" clId="{A809C916-A960-47DA-B21E-7545F12928B4}" dt="2020-10-13T14:34:03.667" v="3012" actId="478"/>
+          <ac:picMkLst>
+            <pc:docMk/>
+            <pc:sldMk cId="2634114682" sldId="356"/>
+            <ac:picMk id="2" creationId="{FF054F5C-2575-462D-85EF-04612DB9A6C0}"/>
+          </ac:picMkLst>
+        </pc:picChg>
+        <pc:picChg chg="add del mod">
+          <ac:chgData name="Armin" userId="c67f3e5b-be9f-4b38-9198-5811d350eee0" providerId="ADAL" clId="{A809C916-A960-47DA-B21E-7545F12928B4}" dt="2020-10-13T14:38:31.101" v="3294" actId="478"/>
+          <ac:picMkLst>
+            <pc:docMk/>
+            <pc:sldMk cId="2634114682" sldId="356"/>
+            <ac:picMk id="4" creationId="{4ABA4C98-9837-41AF-AAEE-5B9FFD239069}"/>
+          </ac:picMkLst>
+        </pc:picChg>
+        <pc:picChg chg="add mod">
+          <ac:chgData name="Armin" userId="c67f3e5b-be9f-4b38-9198-5811d350eee0" providerId="ADAL" clId="{A809C916-A960-47DA-B21E-7545F12928B4}" dt="2020-10-13T14:38:39.924" v="3298" actId="1076"/>
+          <ac:picMkLst>
+            <pc:docMk/>
+            <pc:sldMk cId="2634114682" sldId="356"/>
+            <ac:picMk id="5" creationId="{A9158C67-CB83-412E-AC40-9A2E4F5BFB7F}"/>
+          </ac:picMkLst>
+        </pc:picChg>
+        <pc:picChg chg="del">
+          <ac:chgData name="Armin" userId="c67f3e5b-be9f-4b38-9198-5811d350eee0" providerId="ADAL" clId="{A809C916-A960-47DA-B21E-7545F12928B4}" dt="2020-10-13T14:34:07.897" v="3014" actId="478"/>
+          <ac:picMkLst>
+            <pc:docMk/>
+            <pc:sldMk cId="2634114682" sldId="356"/>
+            <ac:picMk id="6" creationId="{823342E2-CF2D-4450-9412-5461AACC51BB}"/>
+          </ac:picMkLst>
+        </pc:picChg>
+        <pc:cxnChg chg="del">
+          <ac:chgData name="Armin" userId="c67f3e5b-be9f-4b38-9198-5811d350eee0" providerId="ADAL" clId="{A809C916-A960-47DA-B21E-7545F12928B4}" dt="2020-10-13T14:34:06.372" v="3013" actId="478"/>
+          <ac:cxnSpMkLst>
+            <pc:docMk/>
+            <pc:sldMk cId="2634114682" sldId="356"/>
+            <ac:cxnSpMk id="8" creationId="{DFF5CC95-A6B2-491E-815C-90C77162D7E0}"/>
+          </ac:cxnSpMkLst>
+        </pc:cxnChg>
+        <pc:cxnChg chg="del">
+          <ac:chgData name="Armin" userId="c67f3e5b-be9f-4b38-9198-5811d350eee0" providerId="ADAL" clId="{A809C916-A960-47DA-B21E-7545F12928B4}" dt="2020-10-13T14:34:09.466" v="3015" actId="478"/>
+          <ac:cxnSpMkLst>
+            <pc:docMk/>
+            <pc:sldMk cId="2634114682" sldId="356"/>
+            <ac:cxnSpMk id="10" creationId="{9979747A-E2A4-4FFC-B838-4E096B20D40F}"/>
+          </ac:cxnSpMkLst>
+        </pc:cxnChg>
+      </pc:sldChg>
+      <pc:sldChg chg="addSp delSp modSp add mod">
+        <pc:chgData name="Armin" userId="c67f3e5b-be9f-4b38-9198-5811d350eee0" providerId="ADAL" clId="{A809C916-A960-47DA-B21E-7545F12928B4}" dt="2020-10-13T14:42:26.721" v="3781" actId="20577"/>
+        <pc:sldMkLst>
+          <pc:docMk/>
+          <pc:sldMk cId="2833762920" sldId="357"/>
+        </pc:sldMkLst>
+        <pc:spChg chg="mod">
+          <ac:chgData name="Armin" userId="c67f3e5b-be9f-4b38-9198-5811d350eee0" providerId="ADAL" clId="{A809C916-A960-47DA-B21E-7545F12928B4}" dt="2020-10-13T14:42:26.721" v="3781" actId="20577"/>
+          <ac:spMkLst>
+            <pc:docMk/>
+            <pc:sldMk cId="2833762920" sldId="357"/>
+            <ac:spMk id="3" creationId="{1C8B7E14-C857-488D-BB1F-75146BAF3EB9}"/>
+          </ac:spMkLst>
+        </pc:spChg>
+        <pc:picChg chg="add mod modCrop">
+          <ac:chgData name="Armin" userId="c67f3e5b-be9f-4b38-9198-5811d350eee0" providerId="ADAL" clId="{A809C916-A960-47DA-B21E-7545F12928B4}" dt="2020-10-13T14:42:13.989" v="3775" actId="1035"/>
+          <ac:picMkLst>
+            <pc:docMk/>
+            <pc:sldMk cId="2833762920" sldId="357"/>
+            <ac:picMk id="2" creationId="{89F7BC1F-2F43-4F8B-AA98-08B9876C443B}"/>
+          </ac:picMkLst>
+        </pc:picChg>
+        <pc:picChg chg="del">
+          <ac:chgData name="Armin" userId="c67f3e5b-be9f-4b38-9198-5811d350eee0" providerId="ADAL" clId="{A809C916-A960-47DA-B21E-7545F12928B4}" dt="2020-10-13T14:38:42.617" v="3299" actId="478"/>
+          <ac:picMkLst>
+            <pc:docMk/>
+            <pc:sldMk cId="2833762920" sldId="357"/>
+            <ac:picMk id="4" creationId="{4ABA4C98-9837-41AF-AAEE-5B9FFD239069}"/>
+          </ac:picMkLst>
+        </pc:picChg>
+      </pc:sldChg>
     </pc:docChg>
   </pc:docChgLst>
 </pc:chgInfo>
@@ -1481,7 +1603,7 @@
           <a:noFill/>
           <a:extLst>
             <a:ext uri="{909E8E84-426E-40dd-AFC4-6F175D3DCCD1}">
-              <a14:hiddenFill xmlns="" xmlns:a14="http://schemas.microsoft.com/office/drawing/2010/main">
+              <a14:hiddenFill xmlns:a14="http://schemas.microsoft.com/office/drawing/2010/main" xmlns="">
                 <a:solidFill>
                   <a:srgbClr val="FFFFFF"/>
                 </a:solidFill>
@@ -1541,7 +1663,7 @@
             </a:ln>
             <a:extLst>
               <a:ext uri="{91240B29-F687-4f45-9708-019B960494DF}">
-                <a14:hiddenLine xmlns="" xmlns:a14="http://schemas.microsoft.com/office/drawing/2010/main" w="9525">
+                <a14:hiddenLine xmlns:a14="http://schemas.microsoft.com/office/drawing/2010/main" xmlns="" w="9525">
                   <a:solidFill>
                     <a:srgbClr val="000000"/>
                   </a:solidFill>
@@ -1631,7 +1753,7 @@
             </a:ln>
             <a:extLst>
               <a:ext uri="{91240B29-F687-4f45-9708-019B960494DF}">
-                <a14:hiddenLine xmlns="" xmlns:a14="http://schemas.microsoft.com/office/drawing/2010/main" w="9525">
+                <a14:hiddenLine xmlns:a14="http://schemas.microsoft.com/office/drawing/2010/main" xmlns="" w="9525">
                   <a:solidFill>
                     <a:srgbClr val="000000"/>
                   </a:solidFill>
@@ -1721,7 +1843,7 @@
             </a:ln>
             <a:extLst>
               <a:ext uri="{91240B29-F687-4f45-9708-019B960494DF}">
-                <a14:hiddenLine xmlns="" xmlns:a14="http://schemas.microsoft.com/office/drawing/2010/main" w="9525">
+                <a14:hiddenLine xmlns:a14="http://schemas.microsoft.com/office/drawing/2010/main" xmlns="" w="9525">
                   <a:solidFill>
                     <a:srgbClr val="000000"/>
                   </a:solidFill>
@@ -1755,7 +1877,7 @@
             </a:ln>
             <a:extLst>
               <a:ext uri="{91240B29-F687-4f45-9708-019B960494DF}">
-                <a14:hiddenLine xmlns="" xmlns:a14="http://schemas.microsoft.com/office/drawing/2010/main" w="9525">
+                <a14:hiddenLine xmlns:a14="http://schemas.microsoft.com/office/drawing/2010/main" xmlns="" w="9525">
                   <a:solidFill>
                     <a:srgbClr val="000000"/>
                   </a:solidFill>
@@ -1845,7 +1967,7 @@
             </a:ln>
             <a:extLst>
               <a:ext uri="{91240B29-F687-4f45-9708-019B960494DF}">
-                <a14:hiddenLine xmlns="" xmlns:a14="http://schemas.microsoft.com/office/drawing/2010/main" w="9525">
+                <a14:hiddenLine xmlns:a14="http://schemas.microsoft.com/office/drawing/2010/main" xmlns="" w="9525">
                   <a:solidFill>
                     <a:srgbClr val="000000"/>
                   </a:solidFill>
@@ -1907,7 +2029,7 @@
             </a:ln>
             <a:extLst>
               <a:ext uri="{91240B29-F687-4f45-9708-019B960494DF}">
-                <a14:hiddenLine xmlns="" xmlns:a14="http://schemas.microsoft.com/office/drawing/2010/main" w="9525">
+                <a14:hiddenLine xmlns:a14="http://schemas.microsoft.com/office/drawing/2010/main" xmlns="" w="9525">
                   <a:solidFill>
                     <a:srgbClr val="000000"/>
                   </a:solidFill>
@@ -1969,7 +2091,7 @@
             </a:ln>
             <a:extLst>
               <a:ext uri="{91240B29-F687-4f45-9708-019B960494DF}">
-                <a14:hiddenLine xmlns="" xmlns:a14="http://schemas.microsoft.com/office/drawing/2010/main" w="9525">
+                <a14:hiddenLine xmlns:a14="http://schemas.microsoft.com/office/drawing/2010/main" xmlns="" w="9525">
                   <a:solidFill>
                     <a:srgbClr val="000000"/>
                   </a:solidFill>
@@ -2059,7 +2181,7 @@
             </a:ln>
             <a:extLst>
               <a:ext uri="{91240B29-F687-4f45-9708-019B960494DF}">
-                <a14:hiddenLine xmlns="" xmlns:a14="http://schemas.microsoft.com/office/drawing/2010/main" w="9525">
+                <a14:hiddenLine xmlns:a14="http://schemas.microsoft.com/office/drawing/2010/main" xmlns="" w="9525">
                   <a:solidFill>
                     <a:srgbClr val="000000"/>
                   </a:solidFill>
@@ -2121,7 +2243,7 @@
             </a:ln>
             <a:extLst>
               <a:ext uri="{91240B29-F687-4f45-9708-019B960494DF}">
-                <a14:hiddenLine xmlns="" xmlns:a14="http://schemas.microsoft.com/office/drawing/2010/main" w="9525">
+                <a14:hiddenLine xmlns:a14="http://schemas.microsoft.com/office/drawing/2010/main" xmlns="" w="9525">
                   <a:solidFill>
                     <a:srgbClr val="000000"/>
                   </a:solidFill>
@@ -2183,7 +2305,7 @@
             </a:ln>
             <a:extLst>
               <a:ext uri="{91240B29-F687-4f45-9708-019B960494DF}">
-                <a14:hiddenLine xmlns="" xmlns:a14="http://schemas.microsoft.com/office/drawing/2010/main" w="9525">
+                <a14:hiddenLine xmlns:a14="http://schemas.microsoft.com/office/drawing/2010/main" xmlns="" w="9525">
                   <a:solidFill>
                     <a:srgbClr val="000000"/>
                   </a:solidFill>
@@ -2273,7 +2395,7 @@
             </a:ln>
             <a:extLst>
               <a:ext uri="{91240B29-F687-4f45-9708-019B960494DF}">
-                <a14:hiddenLine xmlns="" xmlns:a14="http://schemas.microsoft.com/office/drawing/2010/main" w="9525">
+                <a14:hiddenLine xmlns:a14="http://schemas.microsoft.com/office/drawing/2010/main" xmlns="" w="9525">
                   <a:solidFill>
                     <a:srgbClr val="000000"/>
                   </a:solidFill>
@@ -2363,7 +2485,7 @@
             </a:ln>
             <a:extLst>
               <a:ext uri="{91240B29-F687-4f45-9708-019B960494DF}">
-                <a14:hiddenLine xmlns="" xmlns:a14="http://schemas.microsoft.com/office/drawing/2010/main" w="9525">
+                <a14:hiddenLine xmlns:a14="http://schemas.microsoft.com/office/drawing/2010/main" xmlns="" w="9525">
                   <a:solidFill>
                     <a:srgbClr val="000000"/>
                   </a:solidFill>
@@ -2425,7 +2547,7 @@
             </a:ln>
             <a:extLst>
               <a:ext uri="{91240B29-F687-4f45-9708-019B960494DF}">
-                <a14:hiddenLine xmlns="" xmlns:a14="http://schemas.microsoft.com/office/drawing/2010/main" w="9525">
+                <a14:hiddenLine xmlns:a14="http://schemas.microsoft.com/office/drawing/2010/main" xmlns="" w="9525">
                   <a:solidFill>
                     <a:srgbClr val="000000"/>
                   </a:solidFill>
@@ -2535,7 +2657,7 @@
             </a:ln>
             <a:extLst>
               <a:ext uri="{91240B29-F687-4f45-9708-019B960494DF}">
-                <a14:hiddenLine xmlns="" xmlns:a14="http://schemas.microsoft.com/office/drawing/2010/main" w="9525">
+                <a14:hiddenLine xmlns:a14="http://schemas.microsoft.com/office/drawing/2010/main" xmlns="" w="9525">
                   <a:solidFill>
                     <a:srgbClr val="000000"/>
                   </a:solidFill>
@@ -2597,7 +2719,7 @@
             </a:ln>
             <a:extLst>
               <a:ext uri="{91240B29-F687-4f45-9708-019B960494DF}">
-                <a14:hiddenLine xmlns="" xmlns:a14="http://schemas.microsoft.com/office/drawing/2010/main" w="9525">
+                <a14:hiddenLine xmlns:a14="http://schemas.microsoft.com/office/drawing/2010/main" xmlns="" w="9525">
                   <a:solidFill>
                     <a:srgbClr val="000000"/>
                   </a:solidFill>
@@ -2687,7 +2809,7 @@
             </a:ln>
             <a:extLst>
               <a:ext uri="{91240B29-F687-4f45-9708-019B960494DF}">
-                <a14:hiddenLine xmlns="" xmlns:a14="http://schemas.microsoft.com/office/drawing/2010/main" w="9525">
+                <a14:hiddenLine xmlns:a14="http://schemas.microsoft.com/office/drawing/2010/main" xmlns="" w="9525">
                   <a:solidFill>
                     <a:srgbClr val="000000"/>
                   </a:solidFill>
@@ -2777,7 +2899,7 @@
             </a:ln>
             <a:extLst>
               <a:ext uri="{91240B29-F687-4f45-9708-019B960494DF}">
-                <a14:hiddenLine xmlns="" xmlns:a14="http://schemas.microsoft.com/office/drawing/2010/main" w="9525">
+                <a14:hiddenLine xmlns:a14="http://schemas.microsoft.com/office/drawing/2010/main" xmlns="" w="9525">
                   <a:solidFill>
                     <a:srgbClr val="000000"/>
                   </a:solidFill>
@@ -2839,7 +2961,7 @@
             </a:ln>
             <a:extLst>
               <a:ext uri="{91240B29-F687-4f45-9708-019B960494DF}">
-                <a14:hiddenLine xmlns="" xmlns:a14="http://schemas.microsoft.com/office/drawing/2010/main" w="9525">
+                <a14:hiddenLine xmlns:a14="http://schemas.microsoft.com/office/drawing/2010/main" xmlns="" w="9525">
                   <a:solidFill>
                     <a:srgbClr val="000000"/>
                   </a:solidFill>
@@ -2929,7 +3051,7 @@
             </a:ln>
             <a:extLst>
               <a:ext uri="{91240B29-F687-4f45-9708-019B960494DF}">
-                <a14:hiddenLine xmlns="" xmlns:a14="http://schemas.microsoft.com/office/drawing/2010/main" w="9525">
+                <a14:hiddenLine xmlns:a14="http://schemas.microsoft.com/office/drawing/2010/main" xmlns="" w="9525">
                   <a:solidFill>
                     <a:srgbClr val="000000"/>
                   </a:solidFill>
@@ -3019,7 +3141,7 @@
             </a:ln>
             <a:extLst>
               <a:ext uri="{91240B29-F687-4f45-9708-019B960494DF}">
-                <a14:hiddenLine xmlns="" xmlns:a14="http://schemas.microsoft.com/office/drawing/2010/main" w="9525">
+                <a14:hiddenLine xmlns:a14="http://schemas.microsoft.com/office/drawing/2010/main" xmlns="" w="9525">
                   <a:solidFill>
                     <a:srgbClr val="000000"/>
                   </a:solidFill>
@@ -3075,7 +3197,7 @@
             </a:ln>
             <a:extLst>
               <a:ext uri="{91240B29-F687-4f45-9708-019B960494DF}">
-                <a14:hiddenLine xmlns="" xmlns:a14="http://schemas.microsoft.com/office/drawing/2010/main" w="9525">
+                <a14:hiddenLine xmlns:a14="http://schemas.microsoft.com/office/drawing/2010/main" xmlns="" w="9525">
                   <a:solidFill>
                     <a:srgbClr val="000000"/>
                   </a:solidFill>
@@ -3165,7 +3287,7 @@
             </a:ln>
             <a:extLst>
               <a:ext uri="{91240B29-F687-4f45-9708-019B960494DF}">
-                <a14:hiddenLine xmlns="" xmlns:a14="http://schemas.microsoft.com/office/drawing/2010/main" w="9525">
+                <a14:hiddenLine xmlns:a14="http://schemas.microsoft.com/office/drawing/2010/main" xmlns="" w="9525">
                   <a:solidFill>
                     <a:srgbClr val="000000"/>
                   </a:solidFill>
@@ -3221,7 +3343,7 @@
             </a:ln>
             <a:extLst>
               <a:ext uri="{91240B29-F687-4f45-9708-019B960494DF}">
-                <a14:hiddenLine xmlns="" xmlns:a14="http://schemas.microsoft.com/office/drawing/2010/main" w="9525">
+                <a14:hiddenLine xmlns:a14="http://schemas.microsoft.com/office/drawing/2010/main" xmlns="" w="9525">
                   <a:solidFill>
                     <a:srgbClr val="000000"/>
                   </a:solidFill>
@@ -3311,7 +3433,7 @@
             </a:ln>
             <a:extLst>
               <a:ext uri="{91240B29-F687-4f45-9708-019B960494DF}">
-                <a14:hiddenLine xmlns="" xmlns:a14="http://schemas.microsoft.com/office/drawing/2010/main" w="9525">
+                <a14:hiddenLine xmlns:a14="http://schemas.microsoft.com/office/drawing/2010/main" xmlns="" w="9525">
                   <a:solidFill>
                     <a:srgbClr val="000000"/>
                   </a:solidFill>
@@ -3379,7 +3501,7 @@
             </a:ln>
             <a:extLst>
               <a:ext uri="{91240B29-F687-4f45-9708-019B960494DF}">
-                <a14:hiddenLine xmlns="" xmlns:a14="http://schemas.microsoft.com/office/drawing/2010/main" w="9525">
+                <a14:hiddenLine xmlns:a14="http://schemas.microsoft.com/office/drawing/2010/main" xmlns="" w="9525">
                   <a:solidFill>
                     <a:srgbClr val="000000"/>
                   </a:solidFill>
@@ -3469,7 +3591,7 @@
             </a:ln>
             <a:extLst>
               <a:ext uri="{91240B29-F687-4f45-9708-019B960494DF}">
-                <a14:hiddenLine xmlns="" xmlns:a14="http://schemas.microsoft.com/office/drawing/2010/main" w="9525">
+                <a14:hiddenLine xmlns:a14="http://schemas.microsoft.com/office/drawing/2010/main" xmlns="" w="9525">
                   <a:solidFill>
                     <a:srgbClr val="000000"/>
                   </a:solidFill>
@@ -3537,7 +3659,7 @@
             </a:ln>
             <a:extLst>
               <a:ext uri="{91240B29-F687-4f45-9708-019B960494DF}">
-                <a14:hiddenLine xmlns="" xmlns:a14="http://schemas.microsoft.com/office/drawing/2010/main" w="9525">
+                <a14:hiddenLine xmlns:a14="http://schemas.microsoft.com/office/drawing/2010/main" xmlns="" w="9525">
                   <a:solidFill>
                     <a:srgbClr val="000000"/>
                   </a:solidFill>
@@ -3627,7 +3749,7 @@
             </a:ln>
             <a:extLst>
               <a:ext uri="{91240B29-F687-4f45-9708-019B960494DF}">
-                <a14:hiddenLine xmlns="" xmlns:a14="http://schemas.microsoft.com/office/drawing/2010/main" w="9525">
+                <a14:hiddenLine xmlns:a14="http://schemas.microsoft.com/office/drawing/2010/main" xmlns="" w="9525">
                   <a:solidFill>
                     <a:srgbClr val="000000"/>
                   </a:solidFill>
@@ -3661,7 +3783,7 @@
             </a:ln>
             <a:extLst>
               <a:ext uri="{91240B29-F687-4f45-9708-019B960494DF}">
-                <a14:hiddenLine xmlns="" xmlns:a14="http://schemas.microsoft.com/office/drawing/2010/main" w="9525">
+                <a14:hiddenLine xmlns:a14="http://schemas.microsoft.com/office/drawing/2010/main" xmlns="" w="9525">
                   <a:solidFill>
                     <a:srgbClr val="000000"/>
                   </a:solidFill>
@@ -3751,7 +3873,7 @@
             </a:ln>
             <a:extLst>
               <a:ext uri="{91240B29-F687-4f45-9708-019B960494DF}">
-                <a14:hiddenLine xmlns="" xmlns:a14="http://schemas.microsoft.com/office/drawing/2010/main" w="9525">
+                <a14:hiddenLine xmlns:a14="http://schemas.microsoft.com/office/drawing/2010/main" xmlns="" w="9525">
                   <a:solidFill>
                     <a:srgbClr val="000000"/>
                   </a:solidFill>
@@ -3813,7 +3935,7 @@
             </a:ln>
             <a:extLst>
               <a:ext uri="{91240B29-F687-4f45-9708-019B960494DF}">
-                <a14:hiddenLine xmlns="" xmlns:a14="http://schemas.microsoft.com/office/drawing/2010/main" w="9525">
+                <a14:hiddenLine xmlns:a14="http://schemas.microsoft.com/office/drawing/2010/main" xmlns="" w="9525">
                   <a:solidFill>
                     <a:srgbClr val="000000"/>
                   </a:solidFill>
@@ -3875,7 +3997,7 @@
             </a:ln>
             <a:extLst>
               <a:ext uri="{91240B29-F687-4f45-9708-019B960494DF}">
-                <a14:hiddenLine xmlns="" xmlns:a14="http://schemas.microsoft.com/office/drawing/2010/main" w="9525">
+                <a14:hiddenLine xmlns:a14="http://schemas.microsoft.com/office/drawing/2010/main" xmlns="" w="9525">
                   <a:solidFill>
                     <a:srgbClr val="000000"/>
                   </a:solidFill>
@@ -3965,7 +4087,7 @@
             </a:ln>
             <a:extLst>
               <a:ext uri="{91240B29-F687-4f45-9708-019B960494DF}">
-                <a14:hiddenLine xmlns="" xmlns:a14="http://schemas.microsoft.com/office/drawing/2010/main" w="9525">
+                <a14:hiddenLine xmlns:a14="http://schemas.microsoft.com/office/drawing/2010/main" xmlns="" w="9525">
                   <a:solidFill>
                     <a:srgbClr val="000000"/>
                   </a:solidFill>
@@ -4033,7 +4155,7 @@
             </a:ln>
             <a:extLst>
               <a:ext uri="{91240B29-F687-4f45-9708-019B960494DF}">
-                <a14:hiddenLine xmlns="" xmlns:a14="http://schemas.microsoft.com/office/drawing/2010/main" w="9525">
+                <a14:hiddenLine xmlns:a14="http://schemas.microsoft.com/office/drawing/2010/main" xmlns="" w="9525">
                   <a:solidFill>
                     <a:srgbClr val="000000"/>
                   </a:solidFill>
@@ -4095,7 +4217,7 @@
             </a:ln>
             <a:extLst>
               <a:ext uri="{91240B29-F687-4f45-9708-019B960494DF}">
-                <a14:hiddenLine xmlns="" xmlns:a14="http://schemas.microsoft.com/office/drawing/2010/main" w="9525">
+                <a14:hiddenLine xmlns:a14="http://schemas.microsoft.com/office/drawing/2010/main" xmlns="" w="9525">
                   <a:solidFill>
                     <a:srgbClr val="000000"/>
                   </a:solidFill>
@@ -4185,7 +4307,7 @@
             </a:ln>
             <a:extLst>
               <a:ext uri="{91240B29-F687-4f45-9708-019B960494DF}">
-                <a14:hiddenLine xmlns="" xmlns:a14="http://schemas.microsoft.com/office/drawing/2010/main" w="9525">
+                <a14:hiddenLine xmlns:a14="http://schemas.microsoft.com/office/drawing/2010/main" xmlns="" w="9525">
                   <a:solidFill>
                     <a:srgbClr val="000000"/>
                   </a:solidFill>
@@ -4247,7 +4369,7 @@
             </a:ln>
             <a:extLst>
               <a:ext uri="{91240B29-F687-4f45-9708-019B960494DF}">
-                <a14:hiddenLine xmlns="" xmlns:a14="http://schemas.microsoft.com/office/drawing/2010/main" w="9525">
+                <a14:hiddenLine xmlns:a14="http://schemas.microsoft.com/office/drawing/2010/main" xmlns="" w="9525">
                   <a:solidFill>
                     <a:srgbClr val="000000"/>
                   </a:solidFill>
@@ -4337,7 +4459,7 @@
             </a:ln>
             <a:extLst>
               <a:ext uri="{91240B29-F687-4f45-9708-019B960494DF}">
-                <a14:hiddenLine xmlns="" xmlns:a14="http://schemas.microsoft.com/office/drawing/2010/main" w="9525">
+                <a14:hiddenLine xmlns:a14="http://schemas.microsoft.com/office/drawing/2010/main" xmlns="" w="9525">
                   <a:solidFill>
                     <a:srgbClr val="000000"/>
                   </a:solidFill>
@@ -4399,7 +4521,7 @@
             </a:ln>
             <a:extLst>
               <a:ext uri="{91240B29-F687-4f45-9708-019B960494DF}">
-                <a14:hiddenLine xmlns="" xmlns:a14="http://schemas.microsoft.com/office/drawing/2010/main" w="9525">
+                <a14:hiddenLine xmlns:a14="http://schemas.microsoft.com/office/drawing/2010/main" xmlns="" w="9525">
                   <a:solidFill>
                     <a:srgbClr val="000000"/>
                   </a:solidFill>
@@ -4489,7 +4611,7 @@
             </a:ln>
             <a:extLst>
               <a:ext uri="{91240B29-F687-4f45-9708-019B960494DF}">
-                <a14:hiddenLine xmlns="" xmlns:a14="http://schemas.microsoft.com/office/drawing/2010/main" w="9525">
+                <a14:hiddenLine xmlns:a14="http://schemas.microsoft.com/office/drawing/2010/main" xmlns="" w="9525">
                   <a:solidFill>
                     <a:srgbClr val="000000"/>
                   </a:solidFill>
@@ -4523,7 +4645,7 @@
             </a:ln>
             <a:extLst>
               <a:ext uri="{91240B29-F687-4f45-9708-019B960494DF}">
-                <a14:hiddenLine xmlns="" xmlns:a14="http://schemas.microsoft.com/office/drawing/2010/main" w="9525">
+                <a14:hiddenLine xmlns:a14="http://schemas.microsoft.com/office/drawing/2010/main" xmlns="" w="9525">
                   <a:solidFill>
                     <a:srgbClr val="000000"/>
                   </a:solidFill>
@@ -4588,7 +4710,7 @@
             </a:ln>
             <a:extLst>
               <a:ext uri="{91240B29-F687-4f45-9708-019B960494DF}">
-                <a14:hiddenLine xmlns="" xmlns:a14="http://schemas.microsoft.com/office/drawing/2010/main" w="9525">
+                <a14:hiddenLine xmlns:a14="http://schemas.microsoft.com/office/drawing/2010/main" xmlns="" w="9525">
                   <a:solidFill>
                     <a:srgbClr val="000000"/>
                   </a:solidFill>
@@ -4678,7 +4800,7 @@
             </a:ln>
             <a:extLst>
               <a:ext uri="{91240B29-F687-4f45-9708-019B960494DF}">
-                <a14:hiddenLine xmlns="" xmlns:a14="http://schemas.microsoft.com/office/drawing/2010/main" w="9525">
+                <a14:hiddenLine xmlns:a14="http://schemas.microsoft.com/office/drawing/2010/main" xmlns="" w="9525">
                   <a:solidFill>
                     <a:srgbClr val="000000"/>
                   </a:solidFill>
@@ -4740,7 +4862,7 @@
             </a:ln>
             <a:extLst>
               <a:ext uri="{91240B29-F687-4f45-9708-019B960494DF}">
-                <a14:hiddenLine xmlns="" xmlns:a14="http://schemas.microsoft.com/office/drawing/2010/main" w="9525">
+                <a14:hiddenLine xmlns:a14="http://schemas.microsoft.com/office/drawing/2010/main" xmlns="" w="9525">
                   <a:solidFill>
                     <a:srgbClr val="000000"/>
                   </a:solidFill>
@@ -4830,7 +4952,7 @@
             </a:ln>
             <a:extLst>
               <a:ext uri="{91240B29-F687-4f45-9708-019B960494DF}">
-                <a14:hiddenLine xmlns="" xmlns:a14="http://schemas.microsoft.com/office/drawing/2010/main" w="9525">
+                <a14:hiddenLine xmlns:a14="http://schemas.microsoft.com/office/drawing/2010/main" xmlns="" w="9525">
                   <a:solidFill>
                     <a:srgbClr val="000000"/>
                   </a:solidFill>
@@ -4920,7 +5042,7 @@
             </a:ln>
             <a:extLst>
               <a:ext uri="{91240B29-F687-4f45-9708-019B960494DF}">
-                <a14:hiddenLine xmlns="" xmlns:a14="http://schemas.microsoft.com/office/drawing/2010/main" w="9525">
+                <a14:hiddenLine xmlns:a14="http://schemas.microsoft.com/office/drawing/2010/main" xmlns="" w="9525">
                   <a:solidFill>
                     <a:srgbClr val="000000"/>
                   </a:solidFill>
@@ -4985,7 +5107,7 @@
             </a:ln>
             <a:extLst>
               <a:ext uri="{91240B29-F687-4f45-9708-019B960494DF}">
-                <a14:hiddenLine xmlns="" xmlns:a14="http://schemas.microsoft.com/office/drawing/2010/main" w="9525">
+                <a14:hiddenLine xmlns:a14="http://schemas.microsoft.com/office/drawing/2010/main" xmlns="" w="9525">
                   <a:solidFill>
                     <a:srgbClr val="000000"/>
                   </a:solidFill>
@@ -5047,7 +5169,7 @@
             </a:ln>
             <a:extLst>
               <a:ext uri="{91240B29-F687-4f45-9708-019B960494DF}">
-                <a14:hiddenLine xmlns="" xmlns:a14="http://schemas.microsoft.com/office/drawing/2010/main" w="9525">
+                <a14:hiddenLine xmlns:a14="http://schemas.microsoft.com/office/drawing/2010/main" xmlns="" w="9525">
                   <a:solidFill>
                     <a:srgbClr val="000000"/>
                   </a:solidFill>
@@ -5137,7 +5259,7 @@
             </a:ln>
             <a:extLst>
               <a:ext uri="{91240B29-F687-4f45-9708-019B960494DF}">
-                <a14:hiddenLine xmlns="" xmlns:a14="http://schemas.microsoft.com/office/drawing/2010/main" w="9525">
+                <a14:hiddenLine xmlns:a14="http://schemas.microsoft.com/office/drawing/2010/main" xmlns="" w="9525">
                   <a:solidFill>
                     <a:srgbClr val="000000"/>
                   </a:solidFill>
@@ -5227,7 +5349,7 @@
             </a:ln>
             <a:extLst>
               <a:ext uri="{91240B29-F687-4f45-9708-019B960494DF}">
-                <a14:hiddenLine xmlns="" xmlns:a14="http://schemas.microsoft.com/office/drawing/2010/main" w="9525">
+                <a14:hiddenLine xmlns:a14="http://schemas.microsoft.com/office/drawing/2010/main" xmlns="" w="9525">
                   <a:solidFill>
                     <a:srgbClr val="000000"/>
                   </a:solidFill>
@@ -5289,7 +5411,7 @@
             </a:ln>
             <a:extLst>
               <a:ext uri="{91240B29-F687-4f45-9708-019B960494DF}">
-                <a14:hiddenLine xmlns="" xmlns:a14="http://schemas.microsoft.com/office/drawing/2010/main" w="9525">
+                <a14:hiddenLine xmlns:a14="http://schemas.microsoft.com/office/drawing/2010/main" xmlns="" w="9525">
                   <a:solidFill>
                     <a:srgbClr val="000000"/>
                   </a:solidFill>
@@ -5409,7 +5531,7 @@
             </a:ln>
             <a:extLst>
               <a:ext uri="{91240B29-F687-4f45-9708-019B960494DF}">
-                <a14:hiddenLine xmlns="" xmlns:a14="http://schemas.microsoft.com/office/drawing/2010/main" w="9525">
+                <a14:hiddenLine xmlns:a14="http://schemas.microsoft.com/office/drawing/2010/main" xmlns="" w="9525">
                   <a:solidFill>
                     <a:srgbClr val="000000"/>
                   </a:solidFill>
@@ -5477,7 +5599,7 @@
             </a:ln>
             <a:extLst>
               <a:ext uri="{91240B29-F687-4f45-9708-019B960494DF}">
-                <a14:hiddenLine xmlns="" xmlns:a14="http://schemas.microsoft.com/office/drawing/2010/main" w="9525">
+                <a14:hiddenLine xmlns:a14="http://schemas.microsoft.com/office/drawing/2010/main" xmlns="" w="9525">
                   <a:solidFill>
                     <a:srgbClr val="000000"/>
                   </a:solidFill>
@@ -5567,7 +5689,7 @@
             </a:ln>
             <a:extLst>
               <a:ext uri="{91240B29-F687-4f45-9708-019B960494DF}">
-                <a14:hiddenLine xmlns="" xmlns:a14="http://schemas.microsoft.com/office/drawing/2010/main" w="9525">
+                <a14:hiddenLine xmlns:a14="http://schemas.microsoft.com/office/drawing/2010/main" xmlns="" w="9525">
                   <a:solidFill>
                     <a:srgbClr val="000000"/>
                   </a:solidFill>
@@ -10450,7 +10572,7 @@
           <a:noFill/>
           <a:extLst>
             <a:ext uri="{909E8E84-426E-40dd-AFC4-6F175D3DCCD1}">
-              <a14:hiddenFill xmlns="" xmlns:a14="http://schemas.microsoft.com/office/drawing/2010/main">
+              <a14:hiddenFill xmlns:a14="http://schemas.microsoft.com/office/drawing/2010/main" xmlns="">
                 <a:solidFill>
                   <a:srgbClr val="FFFFFF"/>
                 </a:solidFill>
@@ -10524,7 +10646,7 @@
               </a:ln>
               <a:extLst>
                 <a:ext uri="{91240B29-F687-4f45-9708-019B960494DF}">
-                  <a14:hiddenLine xmlns="" xmlns:a14="http://schemas.microsoft.com/office/drawing/2010/main" w="9525">
+                  <a14:hiddenLine xmlns:a14="http://schemas.microsoft.com/office/drawing/2010/main" xmlns="" w="9525">
                     <a:solidFill>
                       <a:srgbClr val="000000"/>
                     </a:solidFill>
@@ -10614,7 +10736,7 @@
               </a:ln>
               <a:extLst>
                 <a:ext uri="{91240B29-F687-4f45-9708-019B960494DF}">
-                  <a14:hiddenLine xmlns="" xmlns:a14="http://schemas.microsoft.com/office/drawing/2010/main" w="9525">
+                  <a14:hiddenLine xmlns:a14="http://schemas.microsoft.com/office/drawing/2010/main" xmlns="" w="9525">
                     <a:solidFill>
                       <a:srgbClr val="000000"/>
                     </a:solidFill>
@@ -10704,7 +10826,7 @@
               </a:ln>
               <a:extLst>
                 <a:ext uri="{91240B29-F687-4f45-9708-019B960494DF}">
-                  <a14:hiddenLine xmlns="" xmlns:a14="http://schemas.microsoft.com/office/drawing/2010/main" w="9525">
+                  <a14:hiddenLine xmlns:a14="http://schemas.microsoft.com/office/drawing/2010/main" xmlns="" w="9525">
                     <a:solidFill>
                       <a:srgbClr val="000000"/>
                     </a:solidFill>
@@ -10766,7 +10888,7 @@
               </a:ln>
               <a:extLst>
                 <a:ext uri="{91240B29-F687-4f45-9708-019B960494DF}">
-                  <a14:hiddenLine xmlns="" xmlns:a14="http://schemas.microsoft.com/office/drawing/2010/main" w="9525">
+                  <a14:hiddenLine xmlns:a14="http://schemas.microsoft.com/office/drawing/2010/main" xmlns="" w="9525">
                     <a:solidFill>
                       <a:srgbClr val="000000"/>
                     </a:solidFill>
@@ -10856,7 +10978,7 @@
               </a:ln>
               <a:extLst>
                 <a:ext uri="{91240B29-F687-4f45-9708-019B960494DF}">
-                  <a14:hiddenLine xmlns="" xmlns:a14="http://schemas.microsoft.com/office/drawing/2010/main" w="9525">
+                  <a14:hiddenLine xmlns:a14="http://schemas.microsoft.com/office/drawing/2010/main" xmlns="" w="9525">
                     <a:solidFill>
                       <a:srgbClr val="000000"/>
                     </a:solidFill>
@@ -10918,7 +11040,7 @@
               </a:ln>
               <a:extLst>
                 <a:ext uri="{91240B29-F687-4f45-9708-019B960494DF}">
-                  <a14:hiddenLine xmlns="" xmlns:a14="http://schemas.microsoft.com/office/drawing/2010/main" w="9525">
+                  <a14:hiddenLine xmlns:a14="http://schemas.microsoft.com/office/drawing/2010/main" xmlns="" w="9525">
                     <a:solidFill>
                       <a:srgbClr val="000000"/>
                     </a:solidFill>
@@ -10980,7 +11102,7 @@
               </a:ln>
               <a:extLst>
                 <a:ext uri="{91240B29-F687-4f45-9708-019B960494DF}">
-                  <a14:hiddenLine xmlns="" xmlns:a14="http://schemas.microsoft.com/office/drawing/2010/main" w="9525">
+                  <a14:hiddenLine xmlns:a14="http://schemas.microsoft.com/office/drawing/2010/main" xmlns="" w="9525">
                     <a:solidFill>
                       <a:srgbClr val="000000"/>
                     </a:solidFill>
@@ -11070,7 +11192,7 @@
               </a:ln>
               <a:extLst>
                 <a:ext uri="{91240B29-F687-4f45-9708-019B960494DF}">
-                  <a14:hiddenLine xmlns="" xmlns:a14="http://schemas.microsoft.com/office/drawing/2010/main" w="9525">
+                  <a14:hiddenLine xmlns:a14="http://schemas.microsoft.com/office/drawing/2010/main" xmlns="" w="9525">
                     <a:solidFill>
                       <a:srgbClr val="000000"/>
                     </a:solidFill>
@@ -11160,7 +11282,7 @@
               </a:ln>
               <a:extLst>
                 <a:ext uri="{91240B29-F687-4f45-9708-019B960494DF}">
-                  <a14:hiddenLine xmlns="" xmlns:a14="http://schemas.microsoft.com/office/drawing/2010/main" w="9525">
+                  <a14:hiddenLine xmlns:a14="http://schemas.microsoft.com/office/drawing/2010/main" xmlns="" w="9525">
                     <a:solidFill>
                       <a:srgbClr val="000000"/>
                     </a:solidFill>
@@ -11222,7 +11344,7 @@
               </a:ln>
               <a:extLst>
                 <a:ext uri="{91240B29-F687-4f45-9708-019B960494DF}">
-                  <a14:hiddenLine xmlns="" xmlns:a14="http://schemas.microsoft.com/office/drawing/2010/main" w="9525">
+                  <a14:hiddenLine xmlns:a14="http://schemas.microsoft.com/office/drawing/2010/main" xmlns="" w="9525">
                     <a:solidFill>
                       <a:srgbClr val="000000"/>
                     </a:solidFill>
@@ -11332,7 +11454,7 @@
               </a:ln>
               <a:extLst>
                 <a:ext uri="{91240B29-F687-4f45-9708-019B960494DF}">
-                  <a14:hiddenLine xmlns="" xmlns:a14="http://schemas.microsoft.com/office/drawing/2010/main" w="9525">
+                  <a14:hiddenLine xmlns:a14="http://schemas.microsoft.com/office/drawing/2010/main" xmlns="" w="9525">
                     <a:solidFill>
                       <a:srgbClr val="000000"/>
                     </a:solidFill>
@@ -11416,7 +11538,7 @@
               </a:ln>
               <a:extLst>
                 <a:ext uri="{91240B29-F687-4f45-9708-019B960494DF}">
-                  <a14:hiddenLine xmlns="" xmlns:a14="http://schemas.microsoft.com/office/drawing/2010/main" w="9525">
+                  <a14:hiddenLine xmlns:a14="http://schemas.microsoft.com/office/drawing/2010/main" xmlns="" w="9525">
                     <a:solidFill>
                       <a:srgbClr val="000000"/>
                     </a:solidFill>
@@ -11478,7 +11600,7 @@
               </a:ln>
               <a:extLst>
                 <a:ext uri="{91240B29-F687-4f45-9708-019B960494DF}">
-                  <a14:hiddenLine xmlns="" xmlns:a14="http://schemas.microsoft.com/office/drawing/2010/main" w="9525">
+                  <a14:hiddenLine xmlns:a14="http://schemas.microsoft.com/office/drawing/2010/main" xmlns="" w="9525">
                     <a:solidFill>
                       <a:srgbClr val="000000"/>
                     </a:solidFill>
@@ -11540,7 +11662,7 @@
               </a:ln>
               <a:extLst>
                 <a:ext uri="{91240B29-F687-4f45-9708-019B960494DF}">
-                  <a14:hiddenLine xmlns="" xmlns:a14="http://schemas.microsoft.com/office/drawing/2010/main" w="9525">
+                  <a14:hiddenLine xmlns:a14="http://schemas.microsoft.com/office/drawing/2010/main" xmlns="" w="9525">
                     <a:solidFill>
                       <a:srgbClr val="000000"/>
                     </a:solidFill>
@@ -11630,7 +11752,7 @@
               </a:ln>
               <a:extLst>
                 <a:ext uri="{91240B29-F687-4f45-9708-019B960494DF}">
-                  <a14:hiddenLine xmlns="" xmlns:a14="http://schemas.microsoft.com/office/drawing/2010/main" w="9525">
+                  <a14:hiddenLine xmlns:a14="http://schemas.microsoft.com/office/drawing/2010/main" xmlns="" w="9525">
                     <a:solidFill>
                       <a:srgbClr val="000000"/>
                     </a:solidFill>
@@ -11664,7 +11786,7 @@
               </a:ln>
               <a:extLst>
                 <a:ext uri="{91240B29-F687-4f45-9708-019B960494DF}">
-                  <a14:hiddenLine xmlns="" xmlns:a14="http://schemas.microsoft.com/office/drawing/2010/main" w="9525">
+                  <a14:hiddenLine xmlns:a14="http://schemas.microsoft.com/office/drawing/2010/main" xmlns="" w="9525">
                     <a:solidFill>
                       <a:srgbClr val="000000"/>
                     </a:solidFill>
@@ -11729,7 +11851,7 @@
               </a:ln>
               <a:extLst>
                 <a:ext uri="{91240B29-F687-4f45-9708-019B960494DF}">
-                  <a14:hiddenLine xmlns="" xmlns:a14="http://schemas.microsoft.com/office/drawing/2010/main" w="9525">
+                  <a14:hiddenLine xmlns:a14="http://schemas.microsoft.com/office/drawing/2010/main" xmlns="" w="9525">
                     <a:solidFill>
                       <a:srgbClr val="000000"/>
                     </a:solidFill>
@@ -11819,7 +11941,7 @@
               </a:ln>
               <a:extLst>
                 <a:ext uri="{91240B29-F687-4f45-9708-019B960494DF}">
-                  <a14:hiddenLine xmlns="" xmlns:a14="http://schemas.microsoft.com/office/drawing/2010/main" w="9525">
+                  <a14:hiddenLine xmlns:a14="http://schemas.microsoft.com/office/drawing/2010/main" xmlns="" w="9525">
                     <a:solidFill>
                       <a:srgbClr val="000000"/>
                     </a:solidFill>
@@ -11881,7 +12003,7 @@
               </a:ln>
               <a:extLst>
                 <a:ext uri="{91240B29-F687-4f45-9708-019B960494DF}">
-                  <a14:hiddenLine xmlns="" xmlns:a14="http://schemas.microsoft.com/office/drawing/2010/main" w="9525">
+                  <a14:hiddenLine xmlns:a14="http://schemas.microsoft.com/office/drawing/2010/main" xmlns="" w="9525">
                     <a:solidFill>
                       <a:srgbClr val="000000"/>
                     </a:solidFill>
@@ -11971,7 +12093,7 @@
               </a:ln>
               <a:extLst>
                 <a:ext uri="{91240B29-F687-4f45-9708-019B960494DF}">
-                  <a14:hiddenLine xmlns="" xmlns:a14="http://schemas.microsoft.com/office/drawing/2010/main" w="9525">
+                  <a14:hiddenLine xmlns:a14="http://schemas.microsoft.com/office/drawing/2010/main" xmlns="" w="9525">
                     <a:solidFill>
                       <a:srgbClr val="000000"/>
                     </a:solidFill>
@@ -12036,7 +12158,7 @@
               </a:ln>
               <a:extLst>
                 <a:ext uri="{91240B29-F687-4f45-9708-019B960494DF}">
-                  <a14:hiddenLine xmlns="" xmlns:a14="http://schemas.microsoft.com/office/drawing/2010/main" w="9525">
+                  <a14:hiddenLine xmlns:a14="http://schemas.microsoft.com/office/drawing/2010/main" xmlns="" w="9525">
                     <a:solidFill>
                       <a:srgbClr val="000000"/>
                     </a:solidFill>
@@ -12098,7 +12220,7 @@
               </a:ln>
               <a:extLst>
                 <a:ext uri="{91240B29-F687-4f45-9708-019B960494DF}">
-                  <a14:hiddenLine xmlns="" xmlns:a14="http://schemas.microsoft.com/office/drawing/2010/main" w="9525">
+                  <a14:hiddenLine xmlns:a14="http://schemas.microsoft.com/office/drawing/2010/main" xmlns="" w="9525">
                     <a:solidFill>
                       <a:srgbClr val="000000"/>
                     </a:solidFill>
@@ -12188,7 +12310,7 @@
               </a:ln>
               <a:extLst>
                 <a:ext uri="{91240B29-F687-4f45-9708-019B960494DF}">
-                  <a14:hiddenLine xmlns="" xmlns:a14="http://schemas.microsoft.com/office/drawing/2010/main" w="9525">
+                  <a14:hiddenLine xmlns:a14="http://schemas.microsoft.com/office/drawing/2010/main" xmlns="" w="9525">
                     <a:solidFill>
                       <a:srgbClr val="000000"/>
                     </a:solidFill>
@@ -12278,7 +12400,7 @@
               </a:ln>
               <a:extLst>
                 <a:ext uri="{91240B29-F687-4f45-9708-019B960494DF}">
-                  <a14:hiddenLine xmlns="" xmlns:a14="http://schemas.microsoft.com/office/drawing/2010/main" w="9525">
+                  <a14:hiddenLine xmlns:a14="http://schemas.microsoft.com/office/drawing/2010/main" xmlns="" w="9525">
                     <a:solidFill>
                       <a:srgbClr val="000000"/>
                     </a:solidFill>
@@ -12343,7 +12465,7 @@
               </a:ln>
               <a:extLst>
                 <a:ext uri="{91240B29-F687-4f45-9708-019B960494DF}">
-                  <a14:hiddenLine xmlns="" xmlns:a14="http://schemas.microsoft.com/office/drawing/2010/main" w="9525">
+                  <a14:hiddenLine xmlns:a14="http://schemas.microsoft.com/office/drawing/2010/main" xmlns="" w="9525">
                     <a:solidFill>
                       <a:srgbClr val="000000"/>
                     </a:solidFill>
@@ -12463,7 +12585,7 @@
               </a:ln>
               <a:extLst>
                 <a:ext uri="{91240B29-F687-4f45-9708-019B960494DF}">
-                  <a14:hiddenLine xmlns="" xmlns:a14="http://schemas.microsoft.com/office/drawing/2010/main" w="9525">
+                  <a14:hiddenLine xmlns:a14="http://schemas.microsoft.com/office/drawing/2010/main" xmlns="" w="9525">
                     <a:solidFill>
                       <a:srgbClr val="000000"/>
                     </a:solidFill>
@@ -12561,7 +12683,7 @@
               </a:ln>
               <a:extLst>
                 <a:ext uri="{91240B29-F687-4f45-9708-019B960494DF}">
-                  <a14:hiddenLine xmlns="" xmlns:a14="http://schemas.microsoft.com/office/drawing/2010/main" w="9525">
+                  <a14:hiddenLine xmlns:a14="http://schemas.microsoft.com/office/drawing/2010/main" xmlns="" w="9525">
                     <a:solidFill>
                       <a:srgbClr val="000000"/>
                     </a:solidFill>
@@ -12676,7 +12798,7 @@
               </a:ln>
               <a:extLst>
                 <a:ext uri="{91240B29-F687-4f45-9708-019B960494DF}">
-                  <a14:hiddenLine xmlns="" xmlns:a14="http://schemas.microsoft.com/office/drawing/2010/main" w="9525">
+                  <a14:hiddenLine xmlns:a14="http://schemas.microsoft.com/office/drawing/2010/main" xmlns="" w="9525">
                     <a:solidFill>
                       <a:srgbClr val="000000"/>
                     </a:solidFill>
@@ -12766,7 +12888,7 @@
               </a:ln>
               <a:extLst>
                 <a:ext uri="{91240B29-F687-4f45-9708-019B960494DF}">
-                  <a14:hiddenLine xmlns="" xmlns:a14="http://schemas.microsoft.com/office/drawing/2010/main" w="9525">
+                  <a14:hiddenLine xmlns:a14="http://schemas.microsoft.com/office/drawing/2010/main" xmlns="" w="9525">
                     <a:solidFill>
                       <a:srgbClr val="000000"/>
                     </a:solidFill>
@@ -12831,7 +12953,7 @@
               </a:ln>
               <a:extLst>
                 <a:ext uri="{91240B29-F687-4f45-9708-019B960494DF}">
-                  <a14:hiddenLine xmlns="" xmlns:a14="http://schemas.microsoft.com/office/drawing/2010/main" w="9525">
+                  <a14:hiddenLine xmlns:a14="http://schemas.microsoft.com/office/drawing/2010/main" xmlns="" w="9525">
                     <a:solidFill>
                       <a:srgbClr val="000000"/>
                     </a:solidFill>
@@ -12921,7 +13043,7 @@
               </a:ln>
               <a:extLst>
                 <a:ext uri="{91240B29-F687-4f45-9708-019B960494DF}">
-                  <a14:hiddenLine xmlns="" xmlns:a14="http://schemas.microsoft.com/office/drawing/2010/main" w="9525">
+                  <a14:hiddenLine xmlns:a14="http://schemas.microsoft.com/office/drawing/2010/main" xmlns="" w="9525">
                     <a:solidFill>
                       <a:srgbClr val="000000"/>
                     </a:solidFill>
@@ -12989,7 +13111,7 @@
               </a:ln>
               <a:extLst>
                 <a:ext uri="{91240B29-F687-4f45-9708-019B960494DF}">
-                  <a14:hiddenLine xmlns="" xmlns:a14="http://schemas.microsoft.com/office/drawing/2010/main" w="9525">
+                  <a14:hiddenLine xmlns:a14="http://schemas.microsoft.com/office/drawing/2010/main" xmlns="" w="9525">
                     <a:solidFill>
                       <a:srgbClr val="000000"/>
                     </a:solidFill>
@@ -13079,7 +13201,7 @@
               </a:ln>
               <a:extLst>
                 <a:ext uri="{91240B29-F687-4f45-9708-019B960494DF}">
-                  <a14:hiddenLine xmlns="" xmlns:a14="http://schemas.microsoft.com/office/drawing/2010/main" w="9525">
+                  <a14:hiddenLine xmlns:a14="http://schemas.microsoft.com/office/drawing/2010/main" xmlns="" w="9525">
                     <a:solidFill>
                       <a:srgbClr val="000000"/>
                     </a:solidFill>
@@ -13147,7 +13269,7 @@
               </a:ln>
               <a:extLst>
                 <a:ext uri="{91240B29-F687-4f45-9708-019B960494DF}">
-                  <a14:hiddenLine xmlns="" xmlns:a14="http://schemas.microsoft.com/office/drawing/2010/main" w="9525">
+                  <a14:hiddenLine xmlns:a14="http://schemas.microsoft.com/office/drawing/2010/main" xmlns="" w="9525">
                     <a:solidFill>
                       <a:srgbClr val="000000"/>
                     </a:solidFill>
@@ -13237,7 +13359,7 @@
               </a:ln>
               <a:extLst>
                 <a:ext uri="{91240B29-F687-4f45-9708-019B960494DF}">
-                  <a14:hiddenLine xmlns="" xmlns:a14="http://schemas.microsoft.com/office/drawing/2010/main" w="9525">
+                  <a14:hiddenLine xmlns:a14="http://schemas.microsoft.com/office/drawing/2010/main" xmlns="" w="9525">
                     <a:solidFill>
                       <a:srgbClr val="000000"/>
                     </a:solidFill>
@@ -13271,7 +13393,7 @@
               </a:ln>
               <a:extLst>
                 <a:ext uri="{91240B29-F687-4f45-9708-019B960494DF}">
-                  <a14:hiddenLine xmlns="" xmlns:a14="http://schemas.microsoft.com/office/drawing/2010/main" w="9525">
+                  <a14:hiddenLine xmlns:a14="http://schemas.microsoft.com/office/drawing/2010/main" xmlns="" w="9525">
                     <a:solidFill>
                       <a:srgbClr val="000000"/>
                     </a:solidFill>
@@ -15542,102 +15664,6 @@
           </a:fontRef>
         </p:style>
       </p:cxnSp>
-      <p:cxnSp>
-        <p:nvCxnSpPr>
-          <p:cNvPr id="10" name="Gerade Verbindung mit Pfeil 9">
-            <a:extLst>
-              <a:ext uri="{FF2B5EF4-FFF2-40B4-BE49-F238E27FC236}">
-                <a16:creationId xmlns:a16="http://schemas.microsoft.com/office/drawing/2014/main" id="{9979747A-E2A4-4FFC-B838-4E096B20D40F}"/>
-              </a:ext>
-            </a:extLst>
-          </p:cNvPr>
-          <p:cNvCxnSpPr>
-            <a:cxnSpLocks/>
-          </p:cNvCxnSpPr>
-          <p:nvPr/>
-        </p:nvCxnSpPr>
-        <p:spPr>
-          <a:xfrm flipH="1">
-            <a:off x="4786009" y="4387175"/>
-            <a:ext cx="3638145" cy="714063"/>
-          </a:xfrm>
-          <a:prstGeom prst="straightConnector1">
-            <a:avLst/>
-          </a:prstGeom>
-          <a:ln w="28575">
-            <a:solidFill>
-              <a:srgbClr val="FF0000"/>
-            </a:solidFill>
-            <a:tailEnd type="triangle"/>
-          </a:ln>
-        </p:spPr>
-        <p:style>
-          <a:lnRef idx="1">
-            <a:schemeClr val="accent1"/>
-          </a:lnRef>
-          <a:fillRef idx="0">
-            <a:schemeClr val="accent1"/>
-          </a:fillRef>
-          <a:effectRef idx="0">
-            <a:schemeClr val="accent1"/>
-          </a:effectRef>
-          <a:fontRef idx="minor">
-            <a:schemeClr val="tx1"/>
-          </a:fontRef>
-        </p:style>
-      </p:cxnSp>
-      <p:sp>
-        <p:nvSpPr>
-          <p:cNvPr id="15" name="Rechteck 14">
-            <a:extLst>
-              <a:ext uri="{FF2B5EF4-FFF2-40B4-BE49-F238E27FC236}">
-                <a16:creationId xmlns:a16="http://schemas.microsoft.com/office/drawing/2014/main" id="{95B5F7FB-50EF-463B-99B5-A28F40DC5D5B}"/>
-              </a:ext>
-            </a:extLst>
-          </p:cNvPr>
-          <p:cNvSpPr/>
-          <p:nvPr/>
-        </p:nvSpPr>
-        <p:spPr>
-          <a:xfrm>
-            <a:off x="3887805" y="4868683"/>
-            <a:ext cx="994913" cy="393766"/>
-          </a:xfrm>
-          <a:prstGeom prst="rect">
-            <a:avLst/>
-          </a:prstGeom>
-          <a:noFill/>
-          <a:ln>
-            <a:solidFill>
-              <a:srgbClr val="FF0000"/>
-            </a:solidFill>
-          </a:ln>
-        </p:spPr>
-        <p:style>
-          <a:lnRef idx="2">
-            <a:schemeClr val="accent1">
-              <a:shade val="50000"/>
-            </a:schemeClr>
-          </a:lnRef>
-          <a:fillRef idx="1">
-            <a:schemeClr val="accent1"/>
-          </a:fillRef>
-          <a:effectRef idx="0">
-            <a:schemeClr val="accent1"/>
-          </a:effectRef>
-          <a:fontRef idx="minor">
-            <a:schemeClr val="lt1"/>
-          </a:fontRef>
-        </p:style>
-        <p:txBody>
-          <a:bodyPr rtlCol="0" anchor="ctr"/>
-          <a:lstStyle/>
-          <a:p>
-            <a:pPr algn="ctr"/>
-            <a:endParaRPr lang="de-AT"/>
-          </a:p>
-        </p:txBody>
-      </p:sp>
     </p:spTree>
     <p:extLst>
       <p:ext uri="{BB962C8B-B14F-4D97-AF65-F5344CB8AC3E}">
@@ -15699,6 +15725,501 @@
             <a:pPr lvl="1"/>
             <a:r>
               <a:rPr lang="de-AT" dirty="0"/>
+              <a:t>Um die Eingaben per Tastatur am Bildschirm sehen zu können, muss noch folgende Einstellung getroffen werden:</a:t>
+            </a:r>
+          </a:p>
+          <a:p>
+            <a:pPr lvl="2"/>
+            <a:endParaRPr lang="de-AT" dirty="0"/>
+          </a:p>
+          <a:p>
+            <a:pPr lvl="1"/>
+            <a:endParaRPr lang="de-DE" dirty="0"/>
+          </a:p>
+          <a:p>
+            <a:endParaRPr lang="de-DE" dirty="0"/>
+          </a:p>
+          <a:p>
+            <a:endParaRPr lang="de-DE" dirty="0"/>
+          </a:p>
+        </p:txBody>
+      </p:sp>
+      <p:pic>
+        <p:nvPicPr>
+          <p:cNvPr id="5" name="Grafik 4">
+            <a:extLst>
+              <a:ext uri="{FF2B5EF4-FFF2-40B4-BE49-F238E27FC236}">
+                <a16:creationId xmlns:a16="http://schemas.microsoft.com/office/drawing/2014/main" id="{A9158C67-CB83-412E-AC40-9A2E4F5BFB7F}"/>
+              </a:ext>
+            </a:extLst>
+          </p:cNvPr>
+          <p:cNvPicPr>
+            <a:picLocks noChangeAspect="1"/>
+          </p:cNvPicPr>
+          <p:nvPr/>
+        </p:nvPicPr>
+        <p:blipFill>
+          <a:blip r:embed="rId2"/>
+          <a:stretch>
+            <a:fillRect/>
+          </a:stretch>
+        </p:blipFill>
+        <p:spPr>
+          <a:xfrm>
+            <a:off x="3227763" y="1330369"/>
+            <a:ext cx="5945420" cy="5362730"/>
+          </a:xfrm>
+          <a:prstGeom prst="rect">
+            <a:avLst/>
+          </a:prstGeom>
+        </p:spPr>
+      </p:pic>
+    </p:spTree>
+    <p:extLst>
+      <p:ext uri="{BB962C8B-B14F-4D97-AF65-F5344CB8AC3E}">
+        <p14:creationId xmlns:p14="http://schemas.microsoft.com/office/powerpoint/2010/main" val="2634114682"/>
+      </p:ext>
+    </p:extLst>
+  </p:cSld>
+  <p:clrMapOvr>
+    <a:masterClrMapping/>
+  </p:clrMapOvr>
+</p:sld>
+</file>
+
+<file path=ppt/slides/slide2.xml><?xml version="1.0" encoding="utf-8"?>
+<p:sld xmlns:a="http://schemas.openxmlformats.org/drawingml/2006/main" xmlns:r="http://schemas.openxmlformats.org/officeDocument/2006/relationships" xmlns:p="http://schemas.openxmlformats.org/presentationml/2006/main">
+  <p:cSld>
+    <p:spTree>
+      <p:nvGrpSpPr>
+        <p:cNvPr id="1" name=""/>
+        <p:cNvGrpSpPr/>
+        <p:nvPr/>
+      </p:nvGrpSpPr>
+      <p:grpSpPr>
+        <a:xfrm>
+          <a:off x="0" y="0"/>
+          <a:ext cx="0" cy="0"/>
+          <a:chOff x="0" y="0"/>
+          <a:chExt cx="0" cy="0"/>
+        </a:xfrm>
+      </p:grpSpPr>
+      <p:sp>
+        <p:nvSpPr>
+          <p:cNvPr id="2" name="Titel 1">
+            <a:extLst>
+              <a:ext uri="{FF2B5EF4-FFF2-40B4-BE49-F238E27FC236}">
+                <a16:creationId xmlns:a16="http://schemas.microsoft.com/office/drawing/2014/main" id="{DACC1E9C-4FA4-425D-B9B1-BCE738D4019F}"/>
+              </a:ext>
+            </a:extLst>
+          </p:cNvPr>
+          <p:cNvSpPr>
+            <a:spLocks noGrp="1"/>
+          </p:cNvSpPr>
+          <p:nvPr>
+            <p:ph type="title"/>
+          </p:nvPr>
+        </p:nvSpPr>
+        <p:spPr>
+          <a:xfrm>
+            <a:off x="1141413" y="-189350"/>
+            <a:ext cx="9905998" cy="1478570"/>
+          </a:xfrm>
+        </p:spPr>
+        <p:txBody>
+          <a:bodyPr/>
+          <a:lstStyle/>
+          <a:p>
+            <a:r>
+              <a:rPr lang="de-DE" dirty="0"/>
+              <a:t>Inhaltsverzeichnis</a:t>
+            </a:r>
+          </a:p>
+        </p:txBody>
+      </p:sp>
+      <p:sp>
+        <p:nvSpPr>
+          <p:cNvPr id="3" name="Inhaltsplatzhalter 2">
+            <a:extLst>
+              <a:ext uri="{FF2B5EF4-FFF2-40B4-BE49-F238E27FC236}">
+                <a16:creationId xmlns:a16="http://schemas.microsoft.com/office/drawing/2014/main" id="{1C8B7E14-C857-488D-BB1F-75146BAF3EB9}"/>
+              </a:ext>
+            </a:extLst>
+          </p:cNvPr>
+          <p:cNvSpPr>
+            <a:spLocks noGrp="1"/>
+          </p:cNvSpPr>
+          <p:nvPr>
+            <p:ph idx="1"/>
+          </p:nvPr>
+        </p:nvSpPr>
+        <p:spPr>
+          <a:xfrm>
+            <a:off x="1141412" y="843379"/>
+            <a:ext cx="9905999" cy="5841506"/>
+          </a:xfrm>
+        </p:spPr>
+        <p:txBody>
+          <a:bodyPr vert="horz" lIns="91440" tIns="45720" rIns="91440" bIns="45720" rtlCol="0" anchor="t">
+            <a:normAutofit/>
+          </a:bodyPr>
+          <a:lstStyle/>
+          <a:p>
+            <a:r>
+              <a:rPr lang="de-DE" dirty="0"/>
+              <a:t>Libraries einbinden</a:t>
+            </a:r>
+          </a:p>
+          <a:p>
+            <a:r>
+              <a:rPr lang="de-DE" dirty="0"/>
+              <a:t>Arduino verbinden / RC Car </a:t>
+            </a:r>
+            <a:r>
+              <a:rPr lang="de-DE" dirty="0" err="1"/>
+              <a:t>Example</a:t>
+            </a:r>
+            <a:r>
+              <a:rPr lang="de-DE" dirty="0"/>
+              <a:t> Code aufrufen</a:t>
+            </a:r>
+          </a:p>
+          <a:p>
+            <a:r>
+              <a:rPr lang="de-DE" dirty="0"/>
+              <a:t>Aufbau RC Car Arduino Code</a:t>
+            </a:r>
+          </a:p>
+          <a:p>
+            <a:r>
+              <a:rPr lang="de-DE" dirty="0" err="1"/>
+              <a:t>Thingworx</a:t>
+            </a:r>
+            <a:r>
+              <a:rPr lang="de-DE" dirty="0"/>
+              <a:t> Wiederholung</a:t>
+            </a:r>
+          </a:p>
+          <a:p>
+            <a:pPr lvl="1"/>
+            <a:r>
+              <a:rPr lang="de-DE" dirty="0"/>
+              <a:t>Erstellen eines Things</a:t>
+            </a:r>
+          </a:p>
+          <a:p>
+            <a:pPr lvl="1"/>
+            <a:r>
+              <a:rPr lang="de-DE" dirty="0"/>
+              <a:t>Erstellen von Properties</a:t>
+            </a:r>
+          </a:p>
+          <a:p>
+            <a:pPr lvl="1"/>
+            <a:r>
+              <a:rPr lang="de-DE" dirty="0" err="1"/>
+              <a:t>AppKey</a:t>
+            </a:r>
+            <a:r>
+              <a:rPr lang="de-DE" dirty="0"/>
+              <a:t> erstellen</a:t>
+            </a:r>
+          </a:p>
+          <a:p>
+            <a:r>
+              <a:rPr lang="de-DE" dirty="0"/>
+              <a:t>Wichtige Einstellungen in der Library</a:t>
+            </a:r>
+          </a:p>
+          <a:p>
+            <a:r>
+              <a:rPr lang="de-DE" dirty="0"/>
+              <a:t>Arduino Programm hochladen</a:t>
+            </a:r>
+          </a:p>
+          <a:p>
+            <a:pPr lvl="1"/>
+            <a:r>
+              <a:rPr lang="de-DE" dirty="0"/>
+              <a:t>Neue Funktion: Eingabe per serieller Schnittstelle (Software </a:t>
+            </a:r>
+            <a:r>
+              <a:rPr lang="de-DE" dirty="0" err="1"/>
+              <a:t>Putty</a:t>
+            </a:r>
+            <a:r>
+              <a:rPr lang="de-DE" dirty="0"/>
+              <a:t>)</a:t>
+            </a:r>
+          </a:p>
+          <a:p>
+            <a:r>
+              <a:rPr lang="de-DE" dirty="0"/>
+              <a:t>Statusausgabe der Kommunikation</a:t>
+            </a:r>
+          </a:p>
+          <a:p>
+            <a:endParaRPr lang="de-DE" dirty="0"/>
+          </a:p>
+          <a:p>
+            <a:endParaRPr lang="de-DE" dirty="0"/>
+          </a:p>
+        </p:txBody>
+      </p:sp>
+    </p:spTree>
+    <p:extLst>
+      <p:ext uri="{BB962C8B-B14F-4D97-AF65-F5344CB8AC3E}">
+        <p14:creationId xmlns:p14="http://schemas.microsoft.com/office/powerpoint/2010/main" val="540512726"/>
+      </p:ext>
+    </p:extLst>
+  </p:cSld>
+  <p:clrMapOvr>
+    <a:masterClrMapping/>
+  </p:clrMapOvr>
+</p:sld>
+</file>
+
+<file path=ppt/slides/slide20.xml><?xml version="1.0" encoding="utf-8"?>
+<p:sld xmlns:a="http://schemas.openxmlformats.org/drawingml/2006/main" xmlns:r="http://schemas.openxmlformats.org/officeDocument/2006/relationships" xmlns:p="http://schemas.openxmlformats.org/presentationml/2006/main">
+  <p:cSld>
+    <p:spTree>
+      <p:nvGrpSpPr>
+        <p:cNvPr id="1" name=""/>
+        <p:cNvGrpSpPr/>
+        <p:nvPr/>
+      </p:nvGrpSpPr>
+      <p:grpSpPr>
+        <a:xfrm>
+          <a:off x="0" y="0"/>
+          <a:ext cx="0" cy="0"/>
+          <a:chOff x="0" y="0"/>
+          <a:chExt cx="0" cy="0"/>
+        </a:xfrm>
+      </p:grpSpPr>
+      <p:sp>
+        <p:nvSpPr>
+          <p:cNvPr id="3" name="Inhaltsplatzhalter 2">
+            <a:extLst>
+              <a:ext uri="{FF2B5EF4-FFF2-40B4-BE49-F238E27FC236}">
+                <a16:creationId xmlns:a16="http://schemas.microsoft.com/office/drawing/2014/main" id="{1C8B7E14-C857-488D-BB1F-75146BAF3EB9}"/>
+              </a:ext>
+            </a:extLst>
+          </p:cNvPr>
+          <p:cNvSpPr>
+            <a:spLocks noGrp="1"/>
+          </p:cNvSpPr>
+          <p:nvPr>
+            <p:ph idx="1"/>
+          </p:nvPr>
+        </p:nvSpPr>
+        <p:spPr>
+          <a:xfrm>
+            <a:off x="1141412" y="594804"/>
+            <a:ext cx="9905999" cy="6097826"/>
+          </a:xfrm>
+        </p:spPr>
+        <p:txBody>
+          <a:bodyPr vert="horz" lIns="91440" tIns="45720" rIns="91440" bIns="45720" rtlCol="0" anchor="t">
+            <a:normAutofit lnSpcReduction="10000"/>
+          </a:bodyPr>
+          <a:lstStyle/>
+          <a:p>
+            <a:pPr lvl="1"/>
+            <a:r>
+              <a:rPr lang="de-AT" dirty="0"/>
+              <a:t>Nach dem Öffnen wird folgendes Fenster angezeigt:</a:t>
+            </a:r>
+          </a:p>
+          <a:p>
+            <a:pPr lvl="1"/>
+            <a:endParaRPr lang="de-AT" dirty="0"/>
+          </a:p>
+          <a:p>
+            <a:pPr lvl="1"/>
+            <a:endParaRPr lang="de-AT" dirty="0"/>
+          </a:p>
+          <a:p>
+            <a:pPr lvl="1"/>
+            <a:endParaRPr lang="de-AT" dirty="0"/>
+          </a:p>
+          <a:p>
+            <a:pPr lvl="1"/>
+            <a:endParaRPr lang="de-AT" dirty="0"/>
+          </a:p>
+          <a:p>
+            <a:pPr lvl="1"/>
+            <a:endParaRPr lang="de-AT" dirty="0"/>
+          </a:p>
+          <a:p>
+            <a:pPr lvl="1"/>
+            <a:endParaRPr lang="de-AT" dirty="0"/>
+          </a:p>
+          <a:p>
+            <a:pPr lvl="1"/>
+            <a:endParaRPr lang="de-AT" dirty="0"/>
+          </a:p>
+          <a:p>
+            <a:pPr lvl="1"/>
+            <a:endParaRPr lang="de-AT" dirty="0"/>
+          </a:p>
+          <a:p>
+            <a:pPr lvl="1"/>
+            <a:r>
+              <a:rPr lang="de-AT" dirty="0"/>
+              <a:t>Es müssen der Reihe nach der </a:t>
+            </a:r>
+            <a:r>
+              <a:rPr lang="de-AT" dirty="0" err="1"/>
+              <a:t>AppKey</a:t>
+            </a:r>
+            <a:r>
+              <a:rPr lang="de-AT" dirty="0"/>
+              <a:t>, </a:t>
+            </a:r>
+            <a:r>
+              <a:rPr lang="de-AT" dirty="0" err="1"/>
+              <a:t>Thingworx</a:t>
+            </a:r>
+            <a:r>
+              <a:rPr lang="de-AT" dirty="0"/>
+              <a:t> Server, die SSID und das Passwort des WLANs eingegeben werden.</a:t>
+            </a:r>
+          </a:p>
+          <a:p>
+            <a:pPr lvl="1"/>
+            <a:r>
+              <a:rPr lang="de-AT" dirty="0"/>
+              <a:t>Eine Eingabebestätigung wird mit STR+J durchgeführt (UND NICHT MIT ENTER!!!!!!!).</a:t>
+            </a:r>
+          </a:p>
+          <a:p>
+            <a:pPr lvl="1"/>
+            <a:r>
+              <a:rPr lang="de-AT" dirty="0"/>
+              <a:t>Es dar nicht die </a:t>
+            </a:r>
+            <a:r>
+              <a:rPr lang="de-AT" dirty="0" err="1"/>
+              <a:t>Backspace</a:t>
+            </a:r>
+            <a:r>
+              <a:rPr lang="de-AT" dirty="0"/>
+              <a:t> Taste zum Löschen von Buchstaben/Zahlen verwendet werden.</a:t>
+            </a:r>
+          </a:p>
+          <a:p>
+            <a:pPr lvl="1"/>
+            <a:r>
+              <a:rPr lang="de-AT" dirty="0"/>
+              <a:t>Aus der Zwischenablage können Eingaben mit einem Rechtsklick in das Terminal Fenster kopiert werden.</a:t>
+            </a:r>
+          </a:p>
+          <a:p>
+            <a:pPr lvl="2"/>
+            <a:endParaRPr lang="de-AT" dirty="0"/>
+          </a:p>
+          <a:p>
+            <a:pPr lvl="1"/>
+            <a:endParaRPr lang="de-DE" dirty="0"/>
+          </a:p>
+          <a:p>
+            <a:endParaRPr lang="de-DE" dirty="0"/>
+          </a:p>
+          <a:p>
+            <a:endParaRPr lang="de-DE" dirty="0"/>
+          </a:p>
+        </p:txBody>
+      </p:sp>
+      <p:pic>
+        <p:nvPicPr>
+          <p:cNvPr id="2" name="Grafik 1" descr="Ein Bild, das Text enthält.&#10;&#10;Automatisch generierte Beschreibung">
+            <a:extLst>
+              <a:ext uri="{FF2B5EF4-FFF2-40B4-BE49-F238E27FC236}">
+                <a16:creationId xmlns:a16="http://schemas.microsoft.com/office/drawing/2014/main" id="{89F7BC1F-2F43-4F8B-AA98-08B9876C443B}"/>
+              </a:ext>
+            </a:extLst>
+          </p:cNvPr>
+          <p:cNvPicPr>
+            <a:picLocks noChangeAspect="1"/>
+          </p:cNvPicPr>
+          <p:nvPr/>
+        </p:nvPicPr>
+        <p:blipFill rotWithShape="1">
+          <a:blip r:embed="rId2"/>
+          <a:srcRect b="57273"/>
+          <a:stretch/>
+        </p:blipFill>
+        <p:spPr>
+          <a:xfrm>
+            <a:off x="2239681" y="998703"/>
+            <a:ext cx="7886811" cy="3271737"/>
+          </a:xfrm>
+          <a:prstGeom prst="rect">
+            <a:avLst/>
+          </a:prstGeom>
+        </p:spPr>
+      </p:pic>
+    </p:spTree>
+    <p:extLst>
+      <p:ext uri="{BB962C8B-B14F-4D97-AF65-F5344CB8AC3E}">
+        <p14:creationId xmlns:p14="http://schemas.microsoft.com/office/powerpoint/2010/main" val="2833762920"/>
+      </p:ext>
+    </p:extLst>
+  </p:cSld>
+  <p:clrMapOvr>
+    <a:masterClrMapping/>
+  </p:clrMapOvr>
+</p:sld>
+</file>
+
+<file path=ppt/slides/slide21.xml><?xml version="1.0" encoding="utf-8"?>
+<p:sld xmlns:a="http://schemas.openxmlformats.org/drawingml/2006/main" xmlns:r="http://schemas.openxmlformats.org/officeDocument/2006/relationships" xmlns:p="http://schemas.openxmlformats.org/presentationml/2006/main">
+  <p:cSld>
+    <p:spTree>
+      <p:nvGrpSpPr>
+        <p:cNvPr id="1" name=""/>
+        <p:cNvGrpSpPr/>
+        <p:nvPr/>
+      </p:nvGrpSpPr>
+      <p:grpSpPr>
+        <a:xfrm>
+          <a:off x="0" y="0"/>
+          <a:ext cx="0" cy="0"/>
+          <a:chOff x="0" y="0"/>
+          <a:chExt cx="0" cy="0"/>
+        </a:xfrm>
+      </p:grpSpPr>
+      <p:sp>
+        <p:nvSpPr>
+          <p:cNvPr id="3" name="Inhaltsplatzhalter 2">
+            <a:extLst>
+              <a:ext uri="{FF2B5EF4-FFF2-40B4-BE49-F238E27FC236}">
+                <a16:creationId xmlns:a16="http://schemas.microsoft.com/office/drawing/2014/main" id="{1C8B7E14-C857-488D-BB1F-75146BAF3EB9}"/>
+              </a:ext>
+            </a:extLst>
+          </p:cNvPr>
+          <p:cNvSpPr>
+            <a:spLocks noGrp="1"/>
+          </p:cNvSpPr>
+          <p:nvPr>
+            <p:ph idx="1"/>
+          </p:nvPr>
+        </p:nvSpPr>
+        <p:spPr>
+          <a:xfrm>
+            <a:off x="1141412" y="594804"/>
+            <a:ext cx="9905999" cy="5196397"/>
+          </a:xfrm>
+        </p:spPr>
+        <p:txBody>
+          <a:bodyPr vert="horz" lIns="91440" tIns="45720" rIns="91440" bIns="45720" rtlCol="0" anchor="t">
+            <a:normAutofit/>
+          </a:bodyPr>
+          <a:lstStyle/>
+          <a:p>
+            <a:pPr lvl="1"/>
+            <a:r>
+              <a:rPr lang="de-AT" dirty="0"/>
               <a:t>In dieses Status Fenster gelangt man, wenn</a:t>
             </a:r>
           </a:p>
@@ -15706,14 +16227,14 @@
             <a:pPr lvl="2"/>
             <a:r>
               <a:rPr lang="de-AT" dirty="0"/>
-              <a:t>Arduino Programm per Arduino IDE neu hochgeladen</a:t>
+              <a:t>Das Arduino Programm per Arduino IDE neu hochgeladen wird.</a:t>
             </a:r>
           </a:p>
           <a:p>
             <a:pPr lvl="2"/>
             <a:r>
               <a:rPr lang="de-AT" dirty="0"/>
-              <a:t>Beim Start/</a:t>
+              <a:t>beim Start/</a:t>
             </a:r>
             <a:r>
               <a:rPr lang="de-AT" dirty="0" err="1"/>
@@ -15721,7 +16242,7 @@
             </a:r>
             <a:r>
               <a:rPr lang="de-AT" dirty="0"/>
-              <a:t> des Arduinos wird der SETUP Knopf gedrückt</a:t>
+              <a:t> des Arduinos  der SETUP Knopf gedrückt wird.</a:t>
             </a:r>
           </a:p>
           <a:p>
@@ -15729,17 +16250,21 @@
             <a:endParaRPr lang="de-AT" dirty="0"/>
           </a:p>
           <a:p>
+            <a:pPr lvl="2"/>
+            <a:endParaRPr lang="de-AT" dirty="0"/>
+          </a:p>
+          <a:p>
             <a:pPr lvl="1"/>
             <a:r>
               <a:rPr lang="de-AT" dirty="0"/>
-              <a:t>Ziel: RC-Car schnell für Vorstellungen einstellen</a:t>
+              <a:t>Ziel: RC-Car schnell</a:t>
             </a:r>
           </a:p>
           <a:p>
             <a:pPr lvl="2"/>
             <a:r>
               <a:rPr lang="de-AT" dirty="0"/>
-              <a:t>Bei </a:t>
+              <a:t>bei </a:t>
             </a:r>
             <a:r>
               <a:rPr lang="de-AT" dirty="0" err="1"/>
@@ -15754,8 +16279,18 @@
             <a:pPr lvl="2"/>
             <a:r>
               <a:rPr lang="de-AT" dirty="0"/>
-              <a:t>Bei Wifi Änderungen</a:t>
-            </a:r>
+              <a:t>bei Wifi Änderungen</a:t>
+            </a:r>
+          </a:p>
+          <a:p>
+            <a:pPr marL="457200" lvl="1" indent="0">
+              <a:buNone/>
+            </a:pPr>
+            <a:r>
+              <a:rPr lang="de-AT"/>
+              <a:t>konfigurieren zu können.</a:t>
+            </a:r>
+            <a:endParaRPr lang="de-AT" dirty="0"/>
           </a:p>
           <a:p>
             <a:pPr lvl="2"/>
@@ -16001,8 +16536,8 @@
         </p:nvCxnSpPr>
         <p:spPr>
           <a:xfrm>
-            <a:off x="6241003" y="1775534"/>
-            <a:ext cx="887766" cy="1564689"/>
+            <a:off x="5924145" y="1799617"/>
+            <a:ext cx="1204624" cy="1540606"/>
           </a:xfrm>
           <a:prstGeom prst="straightConnector1">
             <a:avLst/>
@@ -16042,199 +16577,7 @@
 </p:sld>
 </file>
 
-<file path=ppt/slides/slide2.xml><?xml version="1.0" encoding="utf-8"?>
-<p:sld xmlns:a="http://schemas.openxmlformats.org/drawingml/2006/main" xmlns:r="http://schemas.openxmlformats.org/officeDocument/2006/relationships" xmlns:p="http://schemas.openxmlformats.org/presentationml/2006/main">
-  <p:cSld>
-    <p:spTree>
-      <p:nvGrpSpPr>
-        <p:cNvPr id="1" name=""/>
-        <p:cNvGrpSpPr/>
-        <p:nvPr/>
-      </p:nvGrpSpPr>
-      <p:grpSpPr>
-        <a:xfrm>
-          <a:off x="0" y="0"/>
-          <a:ext cx="0" cy="0"/>
-          <a:chOff x="0" y="0"/>
-          <a:chExt cx="0" cy="0"/>
-        </a:xfrm>
-      </p:grpSpPr>
-      <p:sp>
-        <p:nvSpPr>
-          <p:cNvPr id="2" name="Titel 1">
-            <a:extLst>
-              <a:ext uri="{FF2B5EF4-FFF2-40B4-BE49-F238E27FC236}">
-                <a16:creationId xmlns:a16="http://schemas.microsoft.com/office/drawing/2014/main" id="{DACC1E9C-4FA4-425D-B9B1-BCE738D4019F}"/>
-              </a:ext>
-            </a:extLst>
-          </p:cNvPr>
-          <p:cNvSpPr>
-            <a:spLocks noGrp="1"/>
-          </p:cNvSpPr>
-          <p:nvPr>
-            <p:ph type="title"/>
-          </p:nvPr>
-        </p:nvSpPr>
-        <p:spPr>
-          <a:xfrm>
-            <a:off x="1141413" y="-189350"/>
-            <a:ext cx="9905998" cy="1478570"/>
-          </a:xfrm>
-        </p:spPr>
-        <p:txBody>
-          <a:bodyPr/>
-          <a:lstStyle/>
-          <a:p>
-            <a:r>
-              <a:rPr lang="de-DE" dirty="0"/>
-              <a:t>Inhaltsverzeichnis</a:t>
-            </a:r>
-          </a:p>
-        </p:txBody>
-      </p:sp>
-      <p:sp>
-        <p:nvSpPr>
-          <p:cNvPr id="3" name="Inhaltsplatzhalter 2">
-            <a:extLst>
-              <a:ext uri="{FF2B5EF4-FFF2-40B4-BE49-F238E27FC236}">
-                <a16:creationId xmlns:a16="http://schemas.microsoft.com/office/drawing/2014/main" id="{1C8B7E14-C857-488D-BB1F-75146BAF3EB9}"/>
-              </a:ext>
-            </a:extLst>
-          </p:cNvPr>
-          <p:cNvSpPr>
-            <a:spLocks noGrp="1"/>
-          </p:cNvSpPr>
-          <p:nvPr>
-            <p:ph idx="1"/>
-          </p:nvPr>
-        </p:nvSpPr>
-        <p:spPr>
-          <a:xfrm>
-            <a:off x="1141412" y="843379"/>
-            <a:ext cx="9905999" cy="5841506"/>
-          </a:xfrm>
-        </p:spPr>
-        <p:txBody>
-          <a:bodyPr vert="horz" lIns="91440" tIns="45720" rIns="91440" bIns="45720" rtlCol="0" anchor="t">
-            <a:normAutofit/>
-          </a:bodyPr>
-          <a:lstStyle/>
-          <a:p>
-            <a:r>
-              <a:rPr lang="de-DE" dirty="0"/>
-              <a:t>Libraries einbinden</a:t>
-            </a:r>
-          </a:p>
-          <a:p>
-            <a:r>
-              <a:rPr lang="de-DE" dirty="0"/>
-              <a:t>Arduino verbinden / RC Car </a:t>
-            </a:r>
-            <a:r>
-              <a:rPr lang="de-DE" dirty="0" err="1"/>
-              <a:t>Example</a:t>
-            </a:r>
-            <a:r>
-              <a:rPr lang="de-DE" dirty="0"/>
-              <a:t> Code aufrufen</a:t>
-            </a:r>
-          </a:p>
-          <a:p>
-            <a:r>
-              <a:rPr lang="de-DE" dirty="0"/>
-              <a:t>Aufbau RC Car Arduino Code</a:t>
-            </a:r>
-          </a:p>
-          <a:p>
-            <a:r>
-              <a:rPr lang="de-DE" dirty="0" err="1"/>
-              <a:t>Thingworx</a:t>
-            </a:r>
-            <a:r>
-              <a:rPr lang="de-DE" dirty="0"/>
-              <a:t> Wiederholung</a:t>
-            </a:r>
-          </a:p>
-          <a:p>
-            <a:pPr lvl="1"/>
-            <a:r>
-              <a:rPr lang="de-DE" dirty="0"/>
-              <a:t>Erstellen eines Things</a:t>
-            </a:r>
-          </a:p>
-          <a:p>
-            <a:pPr lvl="1"/>
-            <a:r>
-              <a:rPr lang="de-DE" dirty="0"/>
-              <a:t>Erstellen von Properties</a:t>
-            </a:r>
-          </a:p>
-          <a:p>
-            <a:pPr lvl="1"/>
-            <a:r>
-              <a:rPr lang="de-DE" dirty="0" err="1"/>
-              <a:t>AppKey</a:t>
-            </a:r>
-            <a:r>
-              <a:rPr lang="de-DE" dirty="0"/>
-              <a:t> erstellen</a:t>
-            </a:r>
-          </a:p>
-          <a:p>
-            <a:r>
-              <a:rPr lang="de-DE" dirty="0"/>
-              <a:t>Wichtige Einstellungen in der Library</a:t>
-            </a:r>
-          </a:p>
-          <a:p>
-            <a:r>
-              <a:rPr lang="de-DE" dirty="0"/>
-              <a:t>Arduino Programm hochladen</a:t>
-            </a:r>
-          </a:p>
-          <a:p>
-            <a:pPr lvl="1"/>
-            <a:r>
-              <a:rPr lang="de-DE" dirty="0"/>
-              <a:t>Neue Funktion: Eingabe per serieller Schnittstelle (Software </a:t>
-            </a:r>
-            <a:r>
-              <a:rPr lang="de-DE" dirty="0" err="1"/>
-              <a:t>Putty</a:t>
-            </a:r>
-            <a:r>
-              <a:rPr lang="de-DE" dirty="0"/>
-              <a:t>)</a:t>
-            </a:r>
-          </a:p>
-          <a:p>
-            <a:r>
-              <a:rPr lang="de-DE" dirty="0"/>
-              <a:t>Statusausgabe der Kommunikation</a:t>
-            </a:r>
-          </a:p>
-          <a:p>
-            <a:endParaRPr lang="de-DE" dirty="0"/>
-          </a:p>
-          <a:p>
-            <a:endParaRPr lang="de-DE" dirty="0"/>
-          </a:p>
-        </p:txBody>
-      </p:sp>
-    </p:spTree>
-    <p:extLst>
-      <p:ext uri="{BB962C8B-B14F-4D97-AF65-F5344CB8AC3E}">
-        <p14:creationId xmlns:p14="http://schemas.microsoft.com/office/powerpoint/2010/main" val="540512726"/>
-      </p:ext>
-    </p:extLst>
-  </p:cSld>
-  <p:clrMapOvr>
-    <a:masterClrMapping/>
-  </p:clrMapOvr>
-</p:sld>
-</file>
-
-<file path=ppt/slides/slide20.xml><?xml version="1.0" encoding="utf-8"?>
+<file path=ppt/slides/slide22.xml><?xml version="1.0" encoding="utf-8"?>
 <p:sld xmlns:a="http://schemas.openxmlformats.org/drawingml/2006/main" xmlns:r="http://schemas.openxmlformats.org/officeDocument/2006/relationships" xmlns:p="http://schemas.openxmlformats.org/presentationml/2006/main">
   <p:cSld>
     <p:spTree>
@@ -16306,7 +16649,7 @@
 </p:sld>
 </file>
 
-<file path=ppt/slides/slide21.xml><?xml version="1.0" encoding="utf-8"?>
+<file path=ppt/slides/slide23.xml><?xml version="1.0" encoding="utf-8"?>
 <p:sld xmlns:a="http://schemas.openxmlformats.org/drawingml/2006/main" xmlns:r="http://schemas.openxmlformats.org/officeDocument/2006/relationships" xmlns:p="http://schemas.openxmlformats.org/presentationml/2006/main">
   <p:cSld>
     <p:spTree>
@@ -16568,7 +16911,7 @@
 </p:sld>
 </file>
 
-<file path=ppt/slides/slide22.xml><?xml version="1.0" encoding="utf-8"?>
+<file path=ppt/slides/slide24.xml><?xml version="1.0" encoding="utf-8"?>
 <p:sld xmlns:a="http://schemas.openxmlformats.org/drawingml/2006/main" xmlns:r="http://schemas.openxmlformats.org/officeDocument/2006/relationships" xmlns:p="http://schemas.openxmlformats.org/presentationml/2006/main">
   <p:cSld>
     <p:spTree>
@@ -16730,7 +17073,7 @@
 </p:sld>
 </file>
 
-<file path=ppt/slides/slide23.xml><?xml version="1.0" encoding="utf-8"?>
+<file path=ppt/slides/slide25.xml><?xml version="1.0" encoding="utf-8"?>
 <p:sld xmlns:a="http://schemas.openxmlformats.org/drawingml/2006/main" xmlns:r="http://schemas.openxmlformats.org/officeDocument/2006/relationships" xmlns:p="http://schemas.openxmlformats.org/presentationml/2006/main">
   <p:cSld>
     <p:spTree>
@@ -17053,7 +17396,7 @@
 </p:sld>
 </file>
 
-<file path=ppt/slides/slide24.xml><?xml version="1.0" encoding="utf-8"?>
+<file path=ppt/slides/slide26.xml><?xml version="1.0" encoding="utf-8"?>
 <p:sld xmlns:a="http://schemas.openxmlformats.org/drawingml/2006/main" xmlns:r="http://schemas.openxmlformats.org/officeDocument/2006/relationships" xmlns:p="http://schemas.openxmlformats.org/presentationml/2006/main">
   <p:cSld>
     <p:spTree>
@@ -17361,7 +17704,7 @@
 </p:sld>
 </file>
 
-<file path=ppt/slides/slide25.xml><?xml version="1.0" encoding="utf-8"?>
+<file path=ppt/slides/slide27.xml><?xml version="1.0" encoding="utf-8"?>
 <p:sld xmlns:a="http://schemas.openxmlformats.org/drawingml/2006/main" xmlns:r="http://schemas.openxmlformats.org/officeDocument/2006/relationships" xmlns:p="http://schemas.openxmlformats.org/presentationml/2006/main">
   <p:cSld>
     <p:spTree>
@@ -17596,7 +17939,7 @@
 </p:sld>
 </file>
 
-<file path=ppt/slides/slide26.xml><?xml version="1.0" encoding="utf-8"?>
+<file path=ppt/slides/slide28.xml><?xml version="1.0" encoding="utf-8"?>
 <p:sld xmlns:a="http://schemas.openxmlformats.org/drawingml/2006/main" xmlns:r="http://schemas.openxmlformats.org/officeDocument/2006/relationships" xmlns:p="http://schemas.openxmlformats.org/presentationml/2006/main">
   <p:cSld>
     <p:spTree>

</xml_diff>